<commit_message>
A couple of typos fixed in slides
</commit_message>
<xml_diff>
--- a/speakers/vpatryshev/intuitionistic-type-theory/IntroToIntuitionisticTypeTheory.pptx
+++ b/speakers/vpatryshev/intuitionistic-type-theory/IntroToIntuitionisticTypeTheory.pptx
@@ -776,8 +776,8 @@
         </p:nvSpPr>
         <p:spPr>
           <a:xfrm>
-            <a:off x="381187" y="685800"/>
-            <a:ext cx="6096299" cy="3429000"/>
+            <a:off x="381000" y="685800"/>
+            <a:ext cx="6096000" cy="3429000"/>
           </a:xfrm>
           <a:custGeom>
             <a:avLst/>
@@ -7152,6 +7152,13 @@
   <p:transition xmlns:p14="http://schemas.microsoft.com/office/powerpoint/2010/main" spd="slow">
     <p:cut/>
   </p:transition>
+  <p:timing>
+    <p:tnLst>
+      <p:par>
+        <p:cTn xmlns:p14="http://schemas.microsoft.com/office/powerpoint/2010/main" id="1" dur="indefinite" restart="never" nodeType="tmRoot"/>
+      </p:par>
+    </p:tnLst>
+  </p:timing>
 </p:sld>
 </file>
 
@@ -7251,11 +7258,11 @@
               <a:buNone/>
             </a:pPr>
             <a:r>
-              <a:rPr lang="en" sz="2400"/>
+              <a:rPr lang="en" sz="2400" dirty="0"/>
               <a:t>Aka </a:t>
             </a:r>
             <a:r>
-              <a:rPr lang="en" sz="2400" b="1">
+              <a:rPr lang="en" sz="2400" b="1" dirty="0">
                 <a:latin typeface="Courier New"/>
                 <a:ea typeface="Courier New"/>
                 <a:cs typeface="Courier New"/>
@@ -7264,11 +7271,11 @@
               <a:t>Unit</a:t>
             </a:r>
             <a:r>
-              <a:rPr lang="en" sz="2400"/>
+              <a:rPr lang="en" sz="2400" dirty="0"/>
               <a:t>, </a:t>
             </a:r>
             <a:r>
-              <a:rPr lang="en" sz="2400" b="1">
+              <a:rPr lang="en" sz="2400" b="1" dirty="0">
                 <a:latin typeface="Courier New"/>
                 <a:ea typeface="Courier New"/>
                 <a:cs typeface="Courier New"/>
@@ -7277,11 +7284,11 @@
               <a:t>⊤</a:t>
             </a:r>
             <a:r>
-              <a:rPr lang="en" sz="2400"/>
+              <a:rPr lang="en" sz="2400" dirty="0"/>
               <a:t> (“top”),</a:t>
             </a:r>
             <a:r>
-              <a:rPr lang="en">
+              <a:rPr lang="en" dirty="0">
                 <a:latin typeface="Courier New"/>
                 <a:ea typeface="Courier New"/>
                 <a:cs typeface="Courier New"/>
@@ -7290,7 +7297,7 @@
               <a:t> </a:t>
             </a:r>
             <a:r>
-              <a:rPr lang="en" b="1">
+              <a:rPr lang="en" b="1" dirty="0">
                 <a:latin typeface="Courier New"/>
                 <a:ea typeface="Courier New"/>
                 <a:cs typeface="Courier New"/>
@@ -7307,11 +7314,11 @@
               <a:buNone/>
             </a:pPr>
             <a:r>
-              <a:rPr lang="en" sz="2400"/>
+              <a:rPr lang="en" sz="2400" dirty="0"/>
               <a:t>For every type there is just one function  </a:t>
             </a:r>
             <a:r>
-              <a:rPr lang="en" sz="2400" b="1">
+              <a:rPr lang="en" sz="2400" b="1" dirty="0">
                 <a:latin typeface="Courier New"/>
                 <a:ea typeface="Courier New"/>
                 <a:cs typeface="Courier New"/>
@@ -7327,7 +7334,7 @@
               </a:spcBef>
               <a:buNone/>
             </a:pPr>
-            <a:endParaRPr sz="2400"/>
+            <a:endParaRPr sz="2400" dirty="0"/>
           </a:p>
           <a:p>
             <a:pPr rtl="0">
@@ -7337,11 +7344,11 @@
               <a:buNone/>
             </a:pPr>
             <a:r>
-              <a:rPr lang="en" sz="2400"/>
+              <a:rPr lang="en" sz="2400" dirty="0"/>
               <a:t>Functions </a:t>
             </a:r>
             <a:r>
-              <a:rPr lang="en" sz="2400" b="1">
+              <a:rPr lang="en" sz="2400" b="1" dirty="0">
                 <a:latin typeface="Courier New"/>
                 <a:ea typeface="Courier New"/>
                 <a:cs typeface="Courier New"/>
@@ -7350,27 +7357,27 @@
               <a:t>⊤→A</a:t>
             </a:r>
             <a:r>
-              <a:rPr lang="en" sz="2400"/>
+              <a:rPr lang="en" sz="2400" dirty="0"/>
               <a:t> are called </a:t>
             </a:r>
             <a:r>
-              <a:rPr lang="en" sz="2400" b="1" i="1"/>
+              <a:rPr lang="en" sz="2400" b="1" i="1" dirty="0"/>
               <a:t>points</a:t>
             </a:r>
             <a:r>
-              <a:rPr lang="en" sz="2400"/>
+              <a:rPr lang="en" sz="2400" dirty="0"/>
               <a:t>, or </a:t>
             </a:r>
             <a:r>
-              <a:rPr lang="en" sz="2400" b="1" i="1"/>
+              <a:rPr lang="en" sz="2400" b="1" i="1" dirty="0"/>
               <a:t>instances</a:t>
             </a:r>
             <a:r>
-              <a:rPr lang="en" sz="2400"/>
+              <a:rPr lang="en" sz="2400" dirty="0"/>
               <a:t> of type </a:t>
             </a:r>
             <a:r>
-              <a:rPr lang="en" sz="2400" b="1">
+              <a:rPr lang="en" sz="2400" b="1" dirty="0">
                 <a:latin typeface="Courier New"/>
                 <a:ea typeface="Courier New"/>
                 <a:cs typeface="Courier New"/>
@@ -7387,11 +7394,11 @@
               <a:buNone/>
             </a:pPr>
             <a:r>
-              <a:rPr lang="en" sz="2400"/>
+              <a:rPr lang="en" sz="2400" dirty="0"/>
               <a:t>So </a:t>
             </a:r>
             <a:r>
-              <a:rPr lang="en" sz="2400" b="1">
+              <a:rPr lang="en" sz="2400" b="1" dirty="0">
                 <a:latin typeface="Courier New"/>
                 <a:ea typeface="Courier New"/>
                 <a:cs typeface="Courier New"/>
@@ -7400,7 +7407,7 @@
               <a:t>⊤</a:t>
             </a:r>
             <a:r>
-              <a:rPr lang="en" sz="2400"/>
+              <a:rPr lang="en" sz="2400" dirty="0"/>
               <a:t> has just one instance</a:t>
             </a:r>
           </a:p>
@@ -7411,7 +7418,7 @@
               </a:spcBef>
               <a:buNone/>
             </a:pPr>
-            <a:endParaRPr/>
+            <a:endParaRPr dirty="0"/>
           </a:p>
         </p:txBody>
       </p:sp>
@@ -7423,6 +7430,13 @@
   <p:transition xmlns:p14="http://schemas.microsoft.com/office/powerpoint/2010/main" spd="slow">
     <p:cut/>
   </p:transition>
+  <p:timing>
+    <p:tnLst>
+      <p:par>
+        <p:cTn xmlns:p14="http://schemas.microsoft.com/office/powerpoint/2010/main" id="1" dur="indefinite" restart="never" nodeType="tmRoot"/>
+      </p:par>
+    </p:tnLst>
+  </p:timing>
 </p:sld>
 </file>
 
@@ -7506,6 +7520,82 @@
           </a:bodyPr>
           <a:lstStyle/>
           <a:p>
+            <a:r>
+              <a:rPr lang="en" sz="2400" dirty="0"/>
+              <a:t>If </a:t>
+            </a:r>
+            <a:r>
+              <a:rPr lang="en" sz="2400" b="1" dirty="0">
+                <a:latin typeface="Courier New"/>
+                <a:ea typeface="Courier New"/>
+                <a:cs typeface="Courier New"/>
+                <a:sym typeface="Courier New"/>
+              </a:rPr>
+              <a:t>x</a:t>
+            </a:r>
+            <a:r>
+              <a:rPr lang="en" sz="2400" dirty="0"/>
+              <a:t> is an instance of </a:t>
+            </a:r>
+            <a:r>
+              <a:rPr lang="en" sz="2400" b="1" dirty="0">
+                <a:latin typeface="Courier New"/>
+                <a:ea typeface="Courier New"/>
+                <a:cs typeface="Courier New"/>
+                <a:sym typeface="Courier New"/>
+              </a:rPr>
+              <a:t>A</a:t>
+            </a:r>
+            <a:r>
+              <a:rPr lang="en" sz="2400" dirty="0"/>
+              <a:t> (</a:t>
+            </a:r>
+            <a:r>
+              <a:rPr lang="en" sz="2400" b="1">
+                <a:latin typeface="Courier New"/>
+                <a:ea typeface="Courier New"/>
+                <a:cs typeface="Courier New"/>
+                <a:sym typeface="Courier New"/>
+              </a:rPr>
+              <a:t>x</a:t>
+            </a:r>
+            <a:r>
+              <a:rPr lang="en" sz="2400" b="1">
+                <a:latin typeface="Courier New"/>
+                <a:ea typeface="Courier New"/>
+                <a:cs typeface="Courier New"/>
+                <a:sym typeface="Courier New"/>
+              </a:rPr>
+              <a:t>:⊤→</a:t>
+            </a:r>
+            <a:r>
+              <a:rPr lang="en" sz="2400" b="1" dirty="0">
+                <a:latin typeface="Courier New"/>
+                <a:ea typeface="Courier New"/>
+                <a:cs typeface="Courier New"/>
+                <a:sym typeface="Courier New"/>
+              </a:rPr>
+              <a:t>A</a:t>
+            </a:r>
+            <a:r>
+              <a:rPr lang="en" sz="2400" dirty="0"/>
+              <a:t>, or just </a:t>
+            </a:r>
+            <a:r>
+              <a:rPr lang="en" sz="2400" b="1" dirty="0">
+                <a:latin typeface="Courier New"/>
+                <a:ea typeface="Courier New"/>
+                <a:cs typeface="Courier New"/>
+                <a:sym typeface="Courier New"/>
+              </a:rPr>
+              <a:t>x:A</a:t>
+            </a:r>
+            <a:r>
+              <a:rPr lang="en" sz="2400" dirty="0"/>
+              <a:t>), </a:t>
+            </a:r>
+          </a:p>
+          <a:p>
             <a:pPr rtl="0">
               <a:spcBef>
                 <a:spcPts val="0"/>
@@ -7513,113 +7603,49 @@
               <a:buNone/>
             </a:pPr>
             <a:r>
-              <a:rPr lang="en" sz="2400"/>
-              <a:t>If </a:t>
-            </a:r>
-            <a:r>
-              <a:rPr lang="en" sz="2400" b="1">
-                <a:latin typeface="Courier New"/>
-                <a:ea typeface="Courier New"/>
-                <a:cs typeface="Courier New"/>
-                <a:sym typeface="Courier New"/>
-              </a:rPr>
-              <a:t>x</a:t>
-            </a:r>
-            <a:r>
-              <a:rPr lang="en" sz="2400"/>
+              <a:rPr lang="en" sz="2400" dirty="0"/>
+              <a:t>then, </a:t>
+            </a:r>
+          </a:p>
+          <a:p>
+            <a:pPr rtl="0">
+              <a:spcBef>
+                <a:spcPts val="0"/>
+              </a:spcBef>
+              <a:buNone/>
+            </a:pPr>
+            <a:r>
+              <a:rPr lang="en" sz="2400" dirty="0"/>
+              <a:t>for </a:t>
+            </a:r>
+            <a:r>
+              <a:rPr lang="en" sz="2400" b="1" dirty="0">
+                <a:latin typeface="Courier New"/>
+                <a:ea typeface="Courier New"/>
+                <a:cs typeface="Courier New"/>
+                <a:sym typeface="Courier New"/>
+              </a:rPr>
+              <a:t>f:A→B</a:t>
+            </a:r>
+            <a:r>
+              <a:rPr lang="en" sz="2400" dirty="0"/>
+              <a:t>, </a:t>
+            </a:r>
+            <a:r>
+              <a:rPr lang="en" sz="2400" b="1" dirty="0">
+                <a:latin typeface="Courier New"/>
+                <a:ea typeface="Courier New"/>
+                <a:cs typeface="Courier New"/>
+                <a:sym typeface="Courier New"/>
+              </a:rPr>
+              <a:t>f(x)≡f∘x</a:t>
+            </a:r>
+            <a:r>
+              <a:rPr lang="en" sz="2400" dirty="0"/>
               <a:t> is an instance of </a:t>
             </a:r>
             <a:r>
-              <a:rPr lang="en" sz="2400" b="1">
-                <a:latin typeface="Courier New"/>
-                <a:ea typeface="Courier New"/>
-                <a:cs typeface="Courier New"/>
-                <a:sym typeface="Courier New"/>
-              </a:rPr>
-              <a:t>A</a:t>
-            </a:r>
-            <a:r>
-              <a:rPr lang="en" sz="2400"/>
-              <a:t> (</a:t>
-            </a:r>
-            <a:r>
-              <a:rPr lang="en" sz="2400" b="1">
-                <a:latin typeface="Courier New"/>
-                <a:ea typeface="Courier New"/>
-                <a:cs typeface="Courier New"/>
-                <a:sym typeface="Courier New"/>
-              </a:rPr>
-              <a:t>x:∀x ∃→A</a:t>
-            </a:r>
-            <a:r>
-              <a:rPr lang="en" sz="2400"/>
-              <a:t>, or just </a:t>
-            </a:r>
-            <a:r>
-              <a:rPr lang="en" sz="2400" b="1">
-                <a:latin typeface="Courier New"/>
-                <a:ea typeface="Courier New"/>
-                <a:cs typeface="Courier New"/>
-                <a:sym typeface="Courier New"/>
-              </a:rPr>
-              <a:t>x:A</a:t>
-            </a:r>
-            <a:r>
-              <a:rPr lang="en" sz="2400"/>
-              <a:t>), </a:t>
-            </a:r>
-          </a:p>
-          <a:p>
-            <a:pPr rtl="0">
-              <a:spcBef>
-                <a:spcPts val="0"/>
-              </a:spcBef>
-              <a:buNone/>
-            </a:pPr>
-            <a:r>
-              <a:rPr lang="en" sz="2400"/>
-              <a:t>then, </a:t>
-            </a:r>
-          </a:p>
-          <a:p>
-            <a:pPr rtl="0">
-              <a:spcBef>
-                <a:spcPts val="0"/>
-              </a:spcBef>
-              <a:buNone/>
-            </a:pPr>
-            <a:r>
-              <a:rPr lang="en" sz="2400"/>
-              <a:t>for </a:t>
-            </a:r>
-            <a:r>
-              <a:rPr lang="en" sz="2400" b="1">
-                <a:latin typeface="Courier New"/>
-                <a:ea typeface="Courier New"/>
-                <a:cs typeface="Courier New"/>
-                <a:sym typeface="Courier New"/>
-              </a:rPr>
-              <a:t>f:A→B</a:t>
-            </a:r>
-            <a:r>
-              <a:rPr lang="en" sz="2400"/>
-              <a:t>, </a:t>
-            </a:r>
-            <a:r>
-              <a:rPr lang="en" sz="2400" b="1">
-                <a:latin typeface="Courier New"/>
-                <a:ea typeface="Courier New"/>
-                <a:cs typeface="Courier New"/>
-                <a:sym typeface="Courier New"/>
-              </a:rPr>
-              <a:t>f(x)≡f∘x</a:t>
-            </a:r>
-            <a:r>
-              <a:rPr lang="en" sz="2400"/>
-              <a:t> is an instance of </a:t>
-            </a:r>
-            <a:r>
-              <a:rPr lang="en" sz="2400" b="1">
+              <a:rPr lang="en" sz="2400" b="1" dirty="0">
                 <a:latin typeface="Courier New"/>
                 <a:ea typeface="Courier New"/>
                 <a:cs typeface="Courier New"/>
@@ -7635,7 +7661,7 @@
               </a:spcBef>
               <a:buNone/>
             </a:pPr>
-            <a:endParaRPr sz="2400" b="1">
+            <a:endParaRPr sz="2400" b="1" dirty="0">
               <a:latin typeface="Courier New"/>
               <a:ea typeface="Courier New"/>
               <a:cs typeface="Courier New"/>
@@ -7650,11 +7676,11 @@
               <a:buNone/>
             </a:pPr>
             <a:r>
-              <a:rPr lang="en" sz="2400"/>
+              <a:rPr lang="en" sz="2400" dirty="0"/>
               <a:t> Note that an instance of </a:t>
             </a:r>
             <a:r>
-              <a:rPr lang="en" sz="2400" b="1">
+              <a:rPr lang="en" sz="2400" b="1" dirty="0">
                 <a:latin typeface="Courier New"/>
                 <a:ea typeface="Courier New"/>
                 <a:cs typeface="Courier New"/>
@@ -7663,7 +7689,7 @@
               <a:t>A</a:t>
             </a:r>
             <a:r>
-              <a:rPr lang="en" sz="2400"/>
+              <a:rPr lang="en" sz="2400" dirty="0"/>
               <a:t> is also its subtype! </a:t>
             </a:r>
           </a:p>
@@ -7677,6 +7703,13 @@
   <p:transition xmlns:p14="http://schemas.microsoft.com/office/powerpoint/2010/main" spd="slow">
     <p:cut/>
   </p:transition>
+  <p:timing>
+    <p:tnLst>
+      <p:par>
+        <p:cTn xmlns:p14="http://schemas.microsoft.com/office/powerpoint/2010/main" id="1" dur="indefinite" restart="never" nodeType="tmRoot"/>
+      </p:par>
+    </p:tnLst>
+  </p:timing>
 </p:sld>
 </file>
 
@@ -7968,6 +8001,13 @@
   <p:transition xmlns:p14="http://schemas.microsoft.com/office/powerpoint/2010/main" spd="slow">
     <p:cut/>
   </p:transition>
+  <p:timing>
+    <p:tnLst>
+      <p:par>
+        <p:cTn xmlns:p14="http://schemas.microsoft.com/office/powerpoint/2010/main" id="1" dur="indefinite" restart="never" nodeType="tmRoot"/>
+      </p:par>
+    </p:tnLst>
+  </p:timing>
 </p:sld>
 </file>
 
@@ -8195,6 +8235,13 @@
   <p:transition xmlns:p14="http://schemas.microsoft.com/office/powerpoint/2010/main" spd="slow">
     <p:cut/>
   </p:transition>
+  <p:timing>
+    <p:tnLst>
+      <p:par>
+        <p:cTn xmlns:p14="http://schemas.microsoft.com/office/powerpoint/2010/main" id="1" dur="indefinite" restart="never" nodeType="tmRoot"/>
+      </p:par>
+    </p:tnLst>
+  </p:timing>
 </p:sld>
 </file>
 
@@ -14382,6 +14429,13 @@
   <p:transition xmlns:p14="http://schemas.microsoft.com/office/powerpoint/2010/main" spd="slow">
     <p:cut/>
   </p:transition>
+  <p:timing>
+    <p:tnLst>
+      <p:par>
+        <p:cTn xmlns:p14="http://schemas.microsoft.com/office/powerpoint/2010/main" id="1" dur="indefinite" restart="never" nodeType="tmRoot"/>
+      </p:par>
+    </p:tnLst>
+  </p:timing>
 </p:sld>
 </file>
 
@@ -18180,6 +18234,13 @@
   <p:transition xmlns:p14="http://schemas.microsoft.com/office/powerpoint/2010/main" spd="slow">
     <p:cut/>
   </p:transition>
+  <p:timing>
+    <p:tnLst>
+      <p:par>
+        <p:cTn xmlns:p14="http://schemas.microsoft.com/office/powerpoint/2010/main" id="1" dur="indefinite" restart="never" nodeType="tmRoot"/>
+      </p:par>
+    </p:tnLst>
+  </p:timing>
 </p:sld>
 </file>
 
@@ -18924,6 +18985,13 @@
   <p:transition xmlns:p14="http://schemas.microsoft.com/office/powerpoint/2010/main" spd="slow">
     <p:cut/>
   </p:transition>
+  <p:timing>
+    <p:tnLst>
+      <p:par>
+        <p:cTn xmlns:p14="http://schemas.microsoft.com/office/powerpoint/2010/main" id="1" dur="indefinite" restart="never" nodeType="tmRoot"/>
+      </p:par>
+    </p:tnLst>
+  </p:timing>
 </p:sld>
 </file>
 
@@ -19100,6 +19168,13 @@
   <p:transition xmlns:p14="http://schemas.microsoft.com/office/powerpoint/2010/main" spd="slow">
     <p:cut/>
   </p:transition>
+  <p:timing>
+    <p:tnLst>
+      <p:par>
+        <p:cTn xmlns:p14="http://schemas.microsoft.com/office/powerpoint/2010/main" id="1" dur="indefinite" restart="never" nodeType="tmRoot"/>
+      </p:par>
+    </p:tnLst>
+  </p:timing>
 </p:sld>
 </file>
 
@@ -19267,6 +19342,13 @@
   <p:transition xmlns:p14="http://schemas.microsoft.com/office/powerpoint/2010/main" spd="slow">
     <p:cut/>
   </p:transition>
+  <p:timing>
+    <p:tnLst>
+      <p:par>
+        <p:cTn xmlns:p14="http://schemas.microsoft.com/office/powerpoint/2010/main" id="1" dur="indefinite" restart="never" nodeType="tmRoot"/>
+      </p:par>
+    </p:tnLst>
+  </p:timing>
 </p:sld>
 </file>
 
@@ -19517,6 +19599,13 @@
   <p:transition xmlns:p14="http://schemas.microsoft.com/office/powerpoint/2010/main" spd="slow">
     <p:cut/>
   </p:transition>
+  <p:timing>
+    <p:tnLst>
+      <p:par>
+        <p:cTn xmlns:p14="http://schemas.microsoft.com/office/powerpoint/2010/main" id="1" dur="indefinite" restart="never" nodeType="tmRoot"/>
+      </p:par>
+    </p:tnLst>
+  </p:timing>
 </p:sld>
 </file>
 
@@ -19803,6 +19892,13 @@
   <p:transition xmlns:p14="http://schemas.microsoft.com/office/powerpoint/2010/main" spd="slow">
     <p:cut/>
   </p:transition>
+  <p:timing>
+    <p:tnLst>
+      <p:par>
+        <p:cTn xmlns:p14="http://schemas.microsoft.com/office/powerpoint/2010/main" id="1" dur="indefinite" restart="never" nodeType="tmRoot"/>
+      </p:par>
+    </p:tnLst>
+  </p:timing>
 </p:sld>
 </file>
 

</xml_diff>

<commit_message>
Actually, only now the typos were fixed... `
</commit_message>
<xml_diff>
--- a/speakers/vpatryshev/intuitionistic-type-theory/IntroToIntuitionisticTypeTheory.pptx
+++ b/speakers/vpatryshev/intuitionistic-type-theory/IntroToIntuitionisticTypeTheory.pptx
@@ -1442,8 +1442,8 @@
         </p:nvSpPr>
         <p:spPr>
           <a:xfrm>
-            <a:off x="381187" y="685800"/>
-            <a:ext cx="6096299" cy="3429000"/>
+            <a:off x="381000" y="685800"/>
+            <a:ext cx="6096000" cy="3429000"/>
           </a:xfrm>
           <a:custGeom>
             <a:avLst/>
@@ -2330,8 +2330,8 @@
         </p:nvSpPr>
         <p:spPr>
           <a:xfrm>
-            <a:off x="381187" y="685800"/>
-            <a:ext cx="6096299" cy="3429000"/>
+            <a:off x="381000" y="685800"/>
+            <a:ext cx="6096000" cy="3429000"/>
           </a:xfrm>
           <a:custGeom>
             <a:avLst/>
@@ -2663,8 +2663,8 @@
         </p:nvSpPr>
         <p:spPr>
           <a:xfrm>
-            <a:off x="381187" y="685800"/>
-            <a:ext cx="6096299" cy="3429000"/>
+            <a:off x="381000" y="685800"/>
+            <a:ext cx="6096000" cy="3429000"/>
           </a:xfrm>
           <a:custGeom>
             <a:avLst/>
@@ -2885,8 +2885,8 @@
         </p:nvSpPr>
         <p:spPr>
           <a:xfrm>
-            <a:off x="381187" y="685800"/>
-            <a:ext cx="6096299" cy="3429000"/>
+            <a:off x="381000" y="685800"/>
+            <a:ext cx="6096000" cy="3429000"/>
           </a:xfrm>
           <a:custGeom>
             <a:avLst/>
@@ -7551,7 +7551,7 @@
               <a:t> (</a:t>
             </a:r>
             <a:r>
-              <a:rPr lang="en" sz="2400" b="1">
+              <a:rPr lang="en" sz="2400" b="1" dirty="0">
                 <a:latin typeface="Courier New"/>
                 <a:ea typeface="Courier New"/>
                 <a:cs typeface="Courier New"/>
@@ -7560,7 +7560,7 @@
               <a:t>x</a:t>
             </a:r>
             <a:r>
-              <a:rPr lang="en" sz="2400" b="1">
+              <a:rPr lang="en" sz="2400" b="1" dirty="0">
                 <a:latin typeface="Courier New"/>
                 <a:ea typeface="Courier New"/>
                 <a:cs typeface="Courier New"/>
@@ -8577,6 +8577,13 @@
   <p:transition xmlns:p14="http://schemas.microsoft.com/office/powerpoint/2010/main" spd="slow">
     <p:cut/>
   </p:transition>
+  <p:timing>
+    <p:tnLst>
+      <p:par>
+        <p:cTn xmlns:p14="http://schemas.microsoft.com/office/powerpoint/2010/main" id="1" dur="indefinite" restart="never" nodeType="tmRoot"/>
+      </p:par>
+    </p:tnLst>
+  </p:timing>
 </p:sld>
 </file>
 
@@ -8935,7 +8942,7 @@
         </p:nvCxnSpPr>
         <p:spPr>
           <a:xfrm>
-            <a:off x="523500" y="3966400"/>
+            <a:off x="523500" y="3405483"/>
             <a:ext cx="1429199" cy="0"/>
           </a:xfrm>
           <a:prstGeom prst="straightConnector1">
@@ -8961,6 +8968,13 @@
   <p:transition xmlns:p14="http://schemas.microsoft.com/office/powerpoint/2010/main" spd="slow">
     <p:cut/>
   </p:transition>
+  <p:timing>
+    <p:tnLst>
+      <p:par>
+        <p:cTn xmlns:p14="http://schemas.microsoft.com/office/powerpoint/2010/main" id="1" dur="indefinite" restart="never" nodeType="tmRoot"/>
+      </p:par>
+    </p:tnLst>
+  </p:timing>
 </p:sld>
 </file>
 
@@ -9224,6 +9238,13 @@
   <p:transition xmlns:p14="http://schemas.microsoft.com/office/powerpoint/2010/main" spd="slow">
     <p:cut/>
   </p:transition>
+  <p:timing>
+    <p:tnLst>
+      <p:par>
+        <p:cTn xmlns:p14="http://schemas.microsoft.com/office/powerpoint/2010/main" id="1" dur="indefinite" restart="never" nodeType="tmRoot"/>
+      </p:par>
+    </p:tnLst>
+  </p:timing>
 </p:sld>
 </file>
 
@@ -9323,11 +9344,11 @@
               <a:buNone/>
             </a:pPr>
             <a:r>
-              <a:rPr lang="en" sz="2400"/>
+              <a:rPr lang="en" sz="2400" dirty="0"/>
               <a:t>One special instance of </a:t>
             </a:r>
             <a:r>
-              <a:rPr lang="en" sz="2400" b="1">
+              <a:rPr lang="en" sz="2400" b="1" dirty="0">
                 <a:latin typeface="Courier New"/>
                 <a:ea typeface="Courier New"/>
                 <a:cs typeface="Courier New"/>
@@ -9336,11 +9357,11 @@
               <a:t>Ω</a:t>
             </a:r>
             <a:r>
-              <a:rPr lang="en" sz="2400"/>
+              <a:rPr lang="en" sz="2400" dirty="0"/>
               <a:t> is called </a:t>
             </a:r>
             <a:r>
-              <a:rPr lang="en" sz="2400" b="1" i="1">
+              <a:rPr lang="en" sz="2400" b="1" i="1" dirty="0">
                 <a:latin typeface="Courier New"/>
                 <a:ea typeface="Courier New"/>
                 <a:cs typeface="Courier New"/>
@@ -9349,7 +9370,7 @@
               <a:t>true</a:t>
             </a:r>
             <a:r>
-              <a:rPr lang="en" sz="2400" b="1">
+              <a:rPr lang="en" sz="2400" b="1" dirty="0">
                 <a:latin typeface="Courier New"/>
                 <a:ea typeface="Courier New"/>
                 <a:cs typeface="Courier New"/>
@@ -9366,11 +9387,11 @@
               <a:buNone/>
             </a:pPr>
             <a:r>
-              <a:rPr lang="en" sz="2400"/>
+              <a:rPr lang="en" sz="2400" dirty="0"/>
               <a:t>A function </a:t>
             </a:r>
             <a:r>
-              <a:rPr lang="en" sz="2400" b="1">
+              <a:rPr lang="en" sz="2400" b="1" dirty="0">
                 <a:latin typeface="Courier New"/>
                 <a:ea typeface="Courier New"/>
                 <a:cs typeface="Courier New"/>
@@ -9379,11 +9400,11 @@
               <a:t>A→Ω</a:t>
             </a:r>
             <a:r>
-              <a:rPr lang="en" sz="2400"/>
+              <a:rPr lang="en" sz="2400" dirty="0"/>
               <a:t> is called a </a:t>
             </a:r>
             <a:r>
-              <a:rPr lang="en" sz="2400" i="1"/>
+              <a:rPr lang="en" sz="2400" i="1" dirty="0"/>
               <a:t>predicate</a:t>
             </a:r>
           </a:p>
@@ -9394,7 +9415,7 @@
               </a:spcBef>
               <a:buNone/>
             </a:pPr>
-            <a:endParaRPr sz="2400"/>
+            <a:endParaRPr sz="2400" dirty="0"/>
           </a:p>
           <a:p>
             <a:pPr rtl="0">
@@ -9404,15 +9425,15 @@
               <a:buNone/>
             </a:pPr>
             <a:r>
-              <a:rPr lang="en" sz="2400" b="1"/>
+              <a:rPr lang="en" sz="2400" b="1" dirty="0"/>
               <a:t>Axiom</a:t>
             </a:r>
             <a:r>
-              <a:rPr lang="en" sz="2400"/>
+              <a:rPr lang="en" sz="2400" dirty="0"/>
               <a:t>. Subtypes of </a:t>
             </a:r>
             <a:r>
-              <a:rPr lang="en" sz="2400" b="1">
+              <a:rPr lang="en" sz="2400" b="1" dirty="0">
                 <a:latin typeface="Courier New"/>
                 <a:ea typeface="Courier New"/>
                 <a:cs typeface="Courier New"/>
@@ -9421,11 +9442,11 @@
               <a:t>A</a:t>
             </a:r>
             <a:r>
-              <a:rPr lang="en" sz="2400"/>
+              <a:rPr lang="en" sz="2400" dirty="0"/>
               <a:t> are in one-to-one correspondence with predicates on </a:t>
             </a:r>
             <a:r>
-              <a:rPr lang="en" sz="2400" b="1">
+              <a:rPr lang="en" sz="2400" b="1" dirty="0">
                 <a:latin typeface="Courier New"/>
                 <a:ea typeface="Courier New"/>
                 <a:cs typeface="Courier New"/>
@@ -9434,8 +9455,16 @@
               <a:t>A</a:t>
             </a:r>
             <a:r>
-              <a:rPr lang="en" sz="2400"/>
-              <a:t>, as pullbacks:</a:t>
+              <a:rPr lang="en" sz="2400" dirty="0"/>
+              <a:t>, as </a:t>
+            </a:r>
+            <a:r>
+              <a:rPr lang="en" sz="2400" i="1" dirty="0"/>
+              <a:t>pullbacks</a:t>
+            </a:r>
+            <a:r>
+              <a:rPr lang="en" sz="2400" dirty="0"/>
+              <a:t>:</a:t>
             </a:r>
           </a:p>
           <a:p>
@@ -9446,11 +9475,11 @@
               <a:buNone/>
             </a:pPr>
             <a:r>
-              <a:rPr lang="en" sz="2400"/>
+              <a:rPr lang="en" sz="2400" dirty="0"/>
               <a:t>(in sets, </a:t>
             </a:r>
             <a:r>
-              <a:rPr lang="en" sz="2400">
+              <a:rPr lang="en" sz="2400" dirty="0">
                 <a:latin typeface="Times New Roman"/>
                 <a:ea typeface="Times New Roman"/>
                 <a:cs typeface="Times New Roman"/>
@@ -9459,7 +9488,7 @@
               <a:t>A</a:t>
             </a:r>
             <a:r>
-              <a:rPr lang="en" sz="2400" baseline="-25000">
+              <a:rPr lang="en" sz="2400" baseline="-25000" dirty="0">
                 <a:latin typeface="Times New Roman"/>
                 <a:ea typeface="Times New Roman"/>
                 <a:cs typeface="Times New Roman"/>
@@ -9468,7 +9497,7 @@
               <a:t>1</a:t>
             </a:r>
             <a:r>
-              <a:rPr lang="en" sz="2400">
+              <a:rPr lang="en" sz="2400" dirty="0">
                 <a:latin typeface="Times New Roman"/>
                 <a:ea typeface="Times New Roman"/>
                 <a:cs typeface="Times New Roman"/>
@@ -9477,7 +9506,7 @@
               <a:t>={a∈A | p(a) == true}</a:t>
             </a:r>
             <a:r>
-              <a:rPr lang="en" sz="2400"/>
+              <a:rPr lang="en" sz="2400" dirty="0"/>
               <a:t>)</a:t>
             </a:r>
           </a:p>
@@ -9489,7 +9518,7 @@
               <a:buNone/>
             </a:pPr>
             <a:r>
-              <a:rPr lang="en" sz="2400"/>
+              <a:rPr lang="en" sz="2400" dirty="0"/>
               <a:t>(aka comprehension axiom)</a:t>
             </a:r>
           </a:p>
@@ -9500,7 +9529,7 @@
               </a:spcBef>
               <a:buNone/>
             </a:pPr>
-            <a:endParaRPr sz="2400">
+            <a:endParaRPr sz="2400" dirty="0">
               <a:latin typeface="Courier New"/>
               <a:ea typeface="Courier New"/>
               <a:cs typeface="Courier New"/>
@@ -9545,6 +9574,13 @@
   <p:transition xmlns:p14="http://schemas.microsoft.com/office/powerpoint/2010/main" spd="slow">
     <p:cut/>
   </p:transition>
+  <p:timing>
+    <p:tnLst>
+      <p:par>
+        <p:cTn xmlns:p14="http://schemas.microsoft.com/office/powerpoint/2010/main" id="1" dur="indefinite" restart="never" nodeType="tmRoot"/>
+      </p:par>
+    </p:tnLst>
+  </p:timing>
 </p:sld>
 </file>
 
@@ -10069,6 +10105,13 @@
   <p:transition xmlns:p14="http://schemas.microsoft.com/office/powerpoint/2010/main" spd="slow">
     <p:cut/>
   </p:transition>
+  <p:timing>
+    <p:tnLst>
+      <p:par>
+        <p:cTn xmlns:p14="http://schemas.microsoft.com/office/powerpoint/2010/main" id="1" dur="indefinite" restart="never" nodeType="tmRoot"/>
+      </p:par>
+    </p:tnLst>
+  </p:timing>
 </p:sld>
 </file>
 
@@ -10775,6 +10818,13 @@
   <p:transition xmlns:p14="http://schemas.microsoft.com/office/powerpoint/2010/main" spd="slow">
     <p:cut/>
   </p:transition>
+  <p:timing>
+    <p:tnLst>
+      <p:par>
+        <p:cTn xmlns:p14="http://schemas.microsoft.com/office/powerpoint/2010/main" id="1" dur="indefinite" restart="never" nodeType="tmRoot"/>
+      </p:par>
+    </p:tnLst>
+  </p:timing>
 </p:sld>
 </file>
 
@@ -11354,6 +11404,13 @@
   <p:transition xmlns:p14="http://schemas.microsoft.com/office/powerpoint/2010/main" spd="slow">
     <p:cut/>
   </p:transition>
+  <p:timing>
+    <p:tnLst>
+      <p:par>
+        <p:cTn xmlns:p14="http://schemas.microsoft.com/office/powerpoint/2010/main" id="1" dur="indefinite" restart="never" nodeType="tmRoot"/>
+      </p:par>
+    </p:tnLst>
+  </p:timing>
 </p:sld>
 </file>
 
@@ -11717,6 +11774,13 @@
   <p:transition xmlns:p14="http://schemas.microsoft.com/office/powerpoint/2010/main" spd="slow">
     <p:cut/>
   </p:transition>
+  <p:timing>
+    <p:tnLst>
+      <p:par>
+        <p:cTn xmlns:p14="http://schemas.microsoft.com/office/powerpoint/2010/main" id="1" dur="indefinite" restart="never" nodeType="tmRoot"/>
+      </p:par>
+    </p:tnLst>
+  </p:timing>
 </p:sld>
 </file>
 
@@ -11866,6 +11930,13 @@
   <p:transition xmlns:p14="http://schemas.microsoft.com/office/powerpoint/2010/main" spd="slow">
     <p:cut/>
   </p:transition>
+  <p:timing>
+    <p:tnLst>
+      <p:par>
+        <p:cTn xmlns:p14="http://schemas.microsoft.com/office/powerpoint/2010/main" id="1" dur="indefinite" restart="never" nodeType="tmRoot"/>
+      </p:par>
+    </p:tnLst>
+  </p:timing>
 </p:sld>
 </file>
 
@@ -11956,11 +12027,11 @@
               <a:buNone/>
             </a:pPr>
             <a:r>
-              <a:rPr lang="en" sz="2400"/>
+              <a:rPr lang="en" sz="2400" dirty="0"/>
               <a:t>Empty type: </a:t>
             </a:r>
             <a:r>
-              <a:rPr lang="en" sz="2400" b="1">
+              <a:rPr lang="en" sz="2400" b="1" dirty="0">
                 <a:latin typeface="Courier New"/>
                 <a:ea typeface="Courier New"/>
                 <a:cs typeface="Courier New"/>
@@ -11969,11 +12040,11 @@
               <a:t>Nothing</a:t>
             </a:r>
             <a:r>
-              <a:rPr lang="en" sz="2400"/>
+              <a:rPr lang="en" sz="2400" dirty="0"/>
               <a:t>, </a:t>
             </a:r>
             <a:r>
-              <a:rPr lang="en" sz="2400" b="1">
+              <a:rPr lang="en" sz="2400" b="1" dirty="0">
                 <a:latin typeface="Courier New"/>
                 <a:ea typeface="Courier New"/>
                 <a:cs typeface="Courier New"/>
@@ -11990,15 +12061,15 @@
               <a:buNone/>
             </a:pPr>
             <a:r>
-              <a:rPr lang="en" sz="2400"/>
+              <a:rPr lang="en" sz="2400" dirty="0"/>
               <a:t>Unique </a:t>
             </a:r>
             <a:r>
-              <a:rPr lang="en" sz="2400" b="1"/>
+              <a:rPr lang="en" sz="2400" b="1" dirty="0"/>
               <a:t>⊥</a:t>
             </a:r>
             <a:r>
-              <a:rPr lang="en" sz="2400" b="1">
+              <a:rPr lang="en" sz="2400" b="1" dirty="0">
                 <a:latin typeface="Courier New"/>
                 <a:ea typeface="Courier New"/>
                 <a:cs typeface="Courier New"/>
@@ -12007,7 +12078,7 @@
               <a:t>→A</a:t>
             </a:r>
             <a:r>
-              <a:rPr lang="en" sz="2400">
+              <a:rPr lang="en" sz="2400" dirty="0">
                 <a:latin typeface="Courier New"/>
                 <a:ea typeface="Courier New"/>
                 <a:cs typeface="Courier New"/>
@@ -12016,11 +12087,11 @@
               <a:t> </a:t>
             </a:r>
             <a:r>
-              <a:rPr lang="en" sz="2400"/>
+              <a:rPr lang="en" sz="2400" dirty="0"/>
               <a:t>for each </a:t>
             </a:r>
             <a:r>
-              <a:rPr lang="en" sz="2400" b="1">
+              <a:rPr lang="en" sz="2400" b="1" dirty="0">
                 <a:latin typeface="Courier New"/>
                 <a:ea typeface="Courier New"/>
                 <a:cs typeface="Courier New"/>
@@ -12037,7 +12108,7 @@
               <a:buNone/>
             </a:pPr>
             <a:r>
-              <a:rPr lang="en" sz="2400"/>
+              <a:rPr lang="en" sz="2400" dirty="0"/>
               <a:t>We can build it</a:t>
             </a:r>
           </a:p>
@@ -12054,7 +12125,7 @@
               <a:buChar char="●"/>
             </a:pPr>
             <a:r>
-              <a:rPr lang="en" sz="2400"/>
+              <a:rPr lang="en" sz="2400" dirty="0"/>
               <a:t>take two functions </a:t>
             </a:r>
           </a:p>
@@ -12071,11 +12142,11 @@
               <a:buChar char="●"/>
             </a:pPr>
             <a:r>
-              <a:rPr lang="en" sz="2400"/>
+              <a:rPr lang="en" sz="2400" dirty="0"/>
               <a:t>curry them, getting</a:t>
             </a:r>
             <a:r>
-              <a:rPr lang="en" sz="2400">
+              <a:rPr lang="en" sz="2400" dirty="0">
                 <a:latin typeface="Courier New"/>
                 <a:ea typeface="Courier New"/>
                 <a:cs typeface="Courier New"/>
@@ -12097,7 +12168,7 @@
               <a:buChar char="●"/>
             </a:pPr>
             <a:r>
-              <a:rPr lang="en" sz="2400"/>
+              <a:rPr lang="en" sz="2400" dirty="0"/>
               <a:t>take equalizer: </a:t>
             </a:r>
           </a:p>
@@ -12114,9 +12185,18 @@
               <a:buChar char="●"/>
             </a:pPr>
             <a:r>
-              <a:rPr lang="en" sz="2400"/>
-              <a:t>we have a bottom type</a:t>
-            </a:r>
+              <a:rPr lang="en" sz="2400" dirty="0"/>
+              <a:t>we have a bottom </a:t>
+            </a:r>
+            <a:r>
+              <a:rPr lang="en" sz="2400" dirty="0" smtClean="0"/>
+              <a:t>type</a:t>
+            </a:r>
+            <a:r>
+              <a:rPr lang="ru-RU" sz="2400" dirty="0" smtClean="0"/>
+              <a:t>!</a:t>
+            </a:r>
+            <a:endParaRPr lang="en" sz="2400" dirty="0"/>
           </a:p>
           <a:p>
             <a:pPr marL="457200" lvl="0" indent="-381000" rtl="0">
@@ -12131,11 +12211,11 @@
               <a:buChar char="●"/>
             </a:pPr>
             <a:r>
-              <a:rPr lang="en" sz="2400"/>
+              <a:rPr lang="en" sz="2400" dirty="0"/>
               <a:t>informally it is : </a:t>
             </a:r>
             <a:r>
-              <a:rPr lang="en" sz="2400">
+              <a:rPr lang="en" sz="2400" dirty="0">
                 <a:latin typeface="Times New Roman"/>
                 <a:ea typeface="Times New Roman"/>
                 <a:cs typeface="Times New Roman"/>
@@ -12144,7 +12224,7 @@
               <a:t>{x|∀f  f(x) = x}</a:t>
             </a:r>
             <a:r>
-              <a:rPr lang="en" sz="2400"/>
+              <a:rPr lang="en" sz="2400" dirty="0"/>
               <a:t>)</a:t>
             </a:r>
           </a:p>
@@ -12166,7 +12246,7 @@
         </p:blipFill>
         <p:spPr>
           <a:xfrm>
-            <a:off x="3774764" y="2660850"/>
+            <a:off x="3682582" y="2312659"/>
             <a:ext cx="1766433" cy="503594"/>
           </a:xfrm>
           <a:prstGeom prst="rect">
@@ -12194,7 +12274,7 @@
         </p:blipFill>
         <p:spPr>
           <a:xfrm>
-            <a:off x="3272882" y="3164444"/>
+            <a:off x="3754280" y="2816253"/>
             <a:ext cx="1479642" cy="322694"/>
           </a:xfrm>
           <a:prstGeom prst="rect">
@@ -12222,7 +12302,7 @@
         </p:blipFill>
         <p:spPr>
           <a:xfrm>
-            <a:off x="4412237" y="3558824"/>
+            <a:off x="3551866" y="3138947"/>
             <a:ext cx="2358062" cy="302001"/>
           </a:xfrm>
           <a:prstGeom prst="rect">
@@ -12242,6 +12322,13 @@
   <p:transition xmlns:p14="http://schemas.microsoft.com/office/powerpoint/2010/main" spd="slow">
     <p:cut/>
   </p:transition>
+  <p:timing>
+    <p:tnLst>
+      <p:par>
+        <p:cTn xmlns:p14="http://schemas.microsoft.com/office/powerpoint/2010/main" id="1" dur="indefinite" restart="never" nodeType="tmRoot"/>
+      </p:par>
+    </p:tnLst>
+  </p:timing>
 </p:sld>
 </file>
 
@@ -12341,16 +12428,24 @@
               <a:buNone/>
             </a:pPr>
             <a:r>
-              <a:rPr lang="en" sz="2400"/>
+              <a:rPr lang="en" sz="2400" dirty="0"/>
               <a:t>It classifies the inclusion of </a:t>
             </a:r>
             <a:r>
-              <a:rPr lang="en" sz="2400" b="1"/>
+              <a:rPr lang="en" sz="2400" b="1" dirty="0"/>
               <a:t>Empty</a:t>
             </a:r>
             <a:r>
-              <a:rPr lang="en" sz="2400"/>
-              <a:t> type into Unit type</a:t>
+              <a:rPr lang="en" sz="2400" dirty="0"/>
+              <a:t> type into </a:t>
+            </a:r>
+            <a:r>
+              <a:rPr lang="en" sz="2400" b="1" dirty="0"/>
+              <a:t>Unit</a:t>
+            </a:r>
+            <a:r>
+              <a:rPr lang="en" sz="2400" dirty="0"/>
+              <a:t> type</a:t>
             </a:r>
           </a:p>
         </p:txBody>
@@ -12391,6 +12486,13 @@
   <p:transition xmlns:p14="http://schemas.microsoft.com/office/powerpoint/2010/main" spd="slow">
     <p:cut/>
   </p:transition>
+  <p:timing>
+    <p:tnLst>
+      <p:par>
+        <p:cTn xmlns:p14="http://schemas.microsoft.com/office/powerpoint/2010/main" id="1" dur="indefinite" restart="never" nodeType="tmRoot"/>
+      </p:par>
+    </p:tnLst>
+  </p:timing>
 </p:sld>
 </file>
 
@@ -12685,6 +12787,13 @@
   <p:transition xmlns:p14="http://schemas.microsoft.com/office/powerpoint/2010/main" spd="slow">
     <p:cut/>
   </p:transition>
+  <p:timing>
+    <p:tnLst>
+      <p:par>
+        <p:cTn xmlns:p14="http://schemas.microsoft.com/office/powerpoint/2010/main" id="1" dur="indefinite" restart="never" nodeType="tmRoot"/>
+      </p:par>
+    </p:tnLst>
+  </p:timing>
 </p:sld>
 </file>
 
@@ -12883,6 +12992,13 @@
   <p:transition xmlns:p14="http://schemas.microsoft.com/office/powerpoint/2010/main" spd="slow">
     <p:cut/>
   </p:transition>
+  <p:timing>
+    <p:tnLst>
+      <p:par>
+        <p:cTn xmlns:p14="http://schemas.microsoft.com/office/powerpoint/2010/main" id="1" dur="indefinite" restart="never" nodeType="tmRoot"/>
+      </p:par>
+    </p:tnLst>
+  </p:timing>
 </p:sld>
 </file>
 
@@ -13102,8 +13218,8 @@
         </p:blipFill>
         <p:spPr>
           <a:xfrm>
-            <a:off x="1714500" y="1864275"/>
-            <a:ext cx="5278500" cy="637775"/>
+            <a:off x="1714500" y="1751625"/>
+            <a:ext cx="5278500" cy="532099"/>
           </a:xfrm>
           <a:prstGeom prst="rect">
             <a:avLst/>
@@ -13122,6 +13238,13 @@
   <p:transition xmlns:p14="http://schemas.microsoft.com/office/powerpoint/2010/main" spd="slow">
     <p:cut/>
   </p:transition>
+  <p:timing>
+    <p:tnLst>
+      <p:par>
+        <p:cTn xmlns:p14="http://schemas.microsoft.com/office/powerpoint/2010/main" id="1" dur="indefinite" restart="never" nodeType="tmRoot"/>
+      </p:par>
+    </p:tnLst>
+  </p:timing>
 </p:sld>
 </file>
 
@@ -13320,6 +13443,13 @@
   <p:transition xmlns:p14="http://schemas.microsoft.com/office/powerpoint/2010/main" spd="slow">
     <p:cut/>
   </p:transition>
+  <p:timing>
+    <p:tnLst>
+      <p:par>
+        <p:cTn xmlns:p14="http://schemas.microsoft.com/office/powerpoint/2010/main" id="1" dur="indefinite" restart="never" nodeType="tmRoot"/>
+      </p:par>
+    </p:tnLst>
+  </p:timing>
 </p:sld>
 </file>
 
@@ -13418,19 +13548,13 @@
               <a:buNone/>
             </a:pPr>
             <a:r>
-              <a:rPr lang="en" sz="2400"/>
+              <a:rPr lang="en" sz="2400" dirty="0"/>
               <a:t>This is a generalization of conjunction.</a:t>
             </a:r>
           </a:p>
           <a:p>
-            <a:pPr rtl="0">
-              <a:spcBef>
-                <a:spcPts val="0"/>
-              </a:spcBef>
-              <a:buNone/>
-            </a:pPr>
-            <a:r>
-              <a:rPr lang="en" sz="2400" b="1">
+            <a:r>
+              <a:rPr lang="en" sz="2400" b="1" dirty="0">
                 <a:latin typeface="Courier New"/>
                 <a:ea typeface="Courier New"/>
                 <a:cs typeface="Courier New"/>
@@ -13439,7 +13563,7 @@
               <a:t>∀:Ω</a:t>
             </a:r>
             <a:r>
-              <a:rPr lang="en" sz="2400" b="1" baseline="30000">
+              <a:rPr lang="en" sz="2400" b="1" baseline="30000" dirty="0">
                 <a:latin typeface="Courier New"/>
                 <a:ea typeface="Courier New"/>
                 <a:cs typeface="Courier New"/>
@@ -13448,7 +13572,7 @@
               <a:t>A</a:t>
             </a:r>
             <a:r>
-              <a:rPr lang="en" sz="2400" b="1">
+              <a:rPr lang="en" sz="2400" b="1" dirty="0">
                 <a:latin typeface="Courier New"/>
                 <a:ea typeface="Courier New"/>
                 <a:cs typeface="Courier New"/>
@@ -13457,7 +13581,7 @@
               <a:t>→Ω</a:t>
             </a:r>
             <a:r>
-              <a:rPr lang="en" sz="2400">
+              <a:rPr lang="en" sz="2400" dirty="0">
                 <a:latin typeface="Courier New"/>
                 <a:ea typeface="Courier New"/>
                 <a:cs typeface="Courier New"/>
@@ -13466,11 +13590,11 @@
               <a:t> </a:t>
             </a:r>
             <a:r>
-              <a:rPr lang="en" sz="2400"/>
+              <a:rPr lang="en" sz="2400" dirty="0"/>
               <a:t>classifies </a:t>
             </a:r>
             <a:r>
-              <a:rPr lang="en" sz="2400" b="1">
+              <a:rPr lang="en" sz="2400" b="1" dirty="0">
                 <a:latin typeface="Courier New"/>
                 <a:ea typeface="Courier New"/>
                 <a:cs typeface="Courier New"/>
@@ -13479,7 +13603,7 @@
               <a:t>true</a:t>
             </a:r>
             <a:r>
-              <a:rPr lang="en" sz="2400" b="1" baseline="30000">
+              <a:rPr lang="en" sz="2400" b="1" baseline="30000" dirty="0">
                 <a:latin typeface="Courier New"/>
                 <a:ea typeface="Courier New"/>
                 <a:cs typeface="Courier New"/>
@@ -13488,16 +13612,34 @@
               <a:t>A</a:t>
             </a:r>
             <a:r>
-              <a:rPr lang="en" sz="2400" b="1">
-                <a:latin typeface="Courier New"/>
-                <a:ea typeface="Courier New"/>
-                <a:cs typeface="Courier New"/>
-                <a:sym typeface="Courier New"/>
-              </a:rPr>
-              <a:t>:⊥=⊥</a:t>
-            </a:r>
-            <a:r>
-              <a:rPr lang="en" sz="2400" b="1" baseline="30000">
+              <a:rPr lang="en" sz="2400" b="1" dirty="0" smtClean="0">
+                <a:latin typeface="Courier New"/>
+                <a:ea typeface="Courier New"/>
+                <a:cs typeface="Courier New"/>
+                <a:sym typeface="Courier New"/>
+              </a:rPr>
+              <a:t>:</a:t>
+            </a:r>
+            <a:r>
+              <a:rPr lang="en" sz="2400" b="1" dirty="0">
+                <a:latin typeface="Courier New"/>
+                <a:ea typeface="Courier New"/>
+                <a:cs typeface="Courier New"/>
+                <a:sym typeface="Courier New"/>
+              </a:rPr>
+              <a:t>⊤</a:t>
+            </a:r>
+            <a:r>
+              <a:rPr lang="en" sz="2400" b="1" dirty="0" smtClean="0">
+                <a:latin typeface="Courier New"/>
+                <a:ea typeface="Courier New"/>
+                <a:cs typeface="Courier New"/>
+                <a:sym typeface="Courier New"/>
+              </a:rPr>
+              <a:t>=⊤</a:t>
+            </a:r>
+            <a:r>
+              <a:rPr lang="en" sz="2400" b="1" baseline="30000" dirty="0" smtClean="0">
                 <a:latin typeface="Courier New"/>
                 <a:ea typeface="Courier New"/>
                 <a:cs typeface="Courier New"/>
@@ -13506,7 +13648,7 @@
               <a:t>A</a:t>
             </a:r>
             <a:r>
-              <a:rPr lang="en" sz="2400" b="1">
+              <a:rPr lang="en" sz="2400" b="1" dirty="0" smtClean="0">
                 <a:latin typeface="Courier New"/>
                 <a:ea typeface="Courier New"/>
                 <a:cs typeface="Courier New"/>
@@ -13515,7 +13657,7 @@
               <a:t>→Ω</a:t>
             </a:r>
             <a:r>
-              <a:rPr lang="en" sz="2400" b="1" baseline="30000">
+              <a:rPr lang="en" sz="2400" b="1" baseline="30000" dirty="0" smtClean="0">
                 <a:latin typeface="Courier New"/>
                 <a:ea typeface="Courier New"/>
                 <a:cs typeface="Courier New"/>
@@ -13523,15 +13665,7 @@
               </a:rPr>
               <a:t>A</a:t>
             </a:r>
-          </a:p>
-          <a:p>
-            <a:pPr rtl="0">
-              <a:spcBef>
-                <a:spcPts val="0"/>
-              </a:spcBef>
-              <a:buNone/>
-            </a:pPr>
-            <a:endParaRPr sz="2400" b="1">
+            <a:endParaRPr lang="en" sz="2400" b="1" baseline="30000" dirty="0">
               <a:latin typeface="Courier New"/>
               <a:ea typeface="Courier New"/>
               <a:cs typeface="Courier New"/>
@@ -13545,12 +13679,26 @@
               </a:spcBef>
               <a:buNone/>
             </a:pPr>
-            <a:r>
-              <a:rPr lang="en" sz="2400"/>
+            <a:endParaRPr sz="2400" b="1" dirty="0">
+              <a:latin typeface="Courier New"/>
+              <a:ea typeface="Courier New"/>
+              <a:cs typeface="Courier New"/>
+              <a:sym typeface="Courier New"/>
+            </a:endParaRPr>
+          </a:p>
+          <a:p>
+            <a:pPr rtl="0">
+              <a:spcBef>
+                <a:spcPts val="0"/>
+              </a:spcBef>
+              <a:buNone/>
+            </a:pPr>
+            <a:r>
+              <a:rPr lang="en" sz="2400" dirty="0"/>
               <a:t>Meaning, the extent to which a predicate </a:t>
             </a:r>
             <a:r>
-              <a:rPr lang="en" sz="2400" b="1">
+              <a:rPr lang="en" sz="2400" b="1" dirty="0">
                 <a:latin typeface="Courier New"/>
                 <a:ea typeface="Courier New"/>
                 <a:cs typeface="Courier New"/>
@@ -13567,11 +13715,11 @@
               <a:buNone/>
             </a:pPr>
             <a:r>
-              <a:rPr lang="en" sz="2400"/>
+              <a:rPr lang="en" sz="2400" dirty="0"/>
               <a:t>is true everywhere on </a:t>
             </a:r>
             <a:r>
-              <a:rPr lang="en" sz="2400" b="1">
+              <a:rPr lang="en" sz="2400" b="1" dirty="0">
                 <a:latin typeface="Courier New"/>
                 <a:ea typeface="Courier New"/>
                 <a:cs typeface="Courier New"/>
@@ -13580,7 +13728,7 @@
               <a:t>A</a:t>
             </a:r>
             <a:r>
-              <a:rPr lang="en" sz="2400"/>
+              <a:rPr lang="en" sz="2400" dirty="0"/>
               <a:t>. </a:t>
             </a:r>
           </a:p>
@@ -13591,7 +13739,7 @@
               </a:spcBef>
               <a:buNone/>
             </a:pPr>
-            <a:endParaRPr sz="2400">
+            <a:endParaRPr sz="2400" dirty="0">
               <a:latin typeface="Courier New"/>
               <a:ea typeface="Courier New"/>
               <a:cs typeface="Courier New"/>
@@ -13608,6 +13756,13 @@
   <p:transition xmlns:p14="http://schemas.microsoft.com/office/powerpoint/2010/main" spd="slow">
     <p:cut/>
   </p:transition>
+  <p:timing>
+    <p:tnLst>
+      <p:par>
+        <p:cTn xmlns:p14="http://schemas.microsoft.com/office/powerpoint/2010/main" id="1" dur="indefinite" restart="never" nodeType="tmRoot"/>
+      </p:par>
+    </p:tnLst>
+  </p:timing>
 </p:sld>
 </file>
 
@@ -14531,7 +14686,11 @@
             </a:pPr>
             <a:r>
               <a:rPr lang="en" sz="2400" dirty="0"/>
-              <a:t>For an individual predicate </a:t>
+              <a:t>For </a:t>
+            </a:r>
+            <a:r>
+              <a:rPr lang="en" sz="2400" dirty="0" smtClean="0"/>
+              <a:t>a predicate </a:t>
             </a:r>
             <a:r>
               <a:rPr lang="en" sz="2400" b="1" dirty="0">
@@ -14544,7 +14703,15 @@
             </a:r>
             <a:r>
               <a:rPr lang="en" sz="2400" dirty="0"/>
-              <a:t>, we need to provide </a:t>
+              <a:t>, </a:t>
+            </a:r>
+            <a:r>
+              <a:rPr lang="en-US" sz="2400" dirty="0" smtClean="0"/>
+              <a:t>find a</a:t>
+            </a:r>
+            <a:r>
+              <a:rPr lang="en" sz="2400" dirty="0" smtClean="0"/>
+              <a:t> </a:t>
             </a:r>
             <a:r>
               <a:rPr lang="en" sz="2400" b="1" dirty="0">
@@ -14631,8 +14798,22 @@
             </a:pPr>
             <a:r>
               <a:rPr lang="en" sz="2400" dirty="0"/>
-              <a:t>First, build this function:</a:t>
-            </a:r>
+              <a:t>First, build this function</a:t>
+            </a:r>
+            <a:r>
+              <a:rPr lang="en" sz="2400" dirty="0" smtClean="0"/>
+              <a:t>:</a:t>
+            </a:r>
+            <a:endParaRPr lang="en-US" sz="2400" dirty="0" smtClean="0"/>
+          </a:p>
+          <a:p>
+            <a:pPr rtl="0">
+              <a:spcBef>
+                <a:spcPts val="0"/>
+              </a:spcBef>
+              <a:buNone/>
+            </a:pPr>
+            <a:endParaRPr lang="en" sz="2400" dirty="0"/>
           </a:p>
           <a:p>
             <a:pPr rtl="0">
@@ -14673,7 +14854,7 @@
         </p:blipFill>
         <p:spPr>
           <a:xfrm>
-            <a:off x="4129675" y="2441724"/>
+            <a:off x="4057977" y="2147875"/>
             <a:ext cx="4352923" cy="293849"/>
           </a:xfrm>
           <a:prstGeom prst="rect">
@@ -14701,7 +14882,7 @@
         </p:blipFill>
         <p:spPr>
           <a:xfrm>
-            <a:off x="5464450" y="3369100"/>
+            <a:off x="2548902" y="3246209"/>
             <a:ext cx="3018149" cy="1440024"/>
           </a:xfrm>
           <a:prstGeom prst="rect">
@@ -14721,6 +14902,13 @@
   <p:transition xmlns:p14="http://schemas.microsoft.com/office/powerpoint/2010/main" spd="slow">
     <p:cut/>
   </p:transition>
+  <p:timing>
+    <p:tnLst>
+      <p:par>
+        <p:cTn xmlns:p14="http://schemas.microsoft.com/office/powerpoint/2010/main" id="1" dur="indefinite" restart="never" nodeType="tmRoot"/>
+      </p:par>
+    </p:tnLst>
+  </p:timing>
 </p:sld>
 </file>
 
@@ -14937,6 +15125,13 @@
   <p:transition xmlns:p14="http://schemas.microsoft.com/office/powerpoint/2010/main" spd="slow">
     <p:cut/>
   </p:transition>
+  <p:timing>
+    <p:tnLst>
+      <p:par>
+        <p:cTn xmlns:p14="http://schemas.microsoft.com/office/powerpoint/2010/main" id="1" dur="indefinite" restart="never" nodeType="tmRoot"/>
+      </p:par>
+    </p:tnLst>
+  </p:timing>
 </p:sld>
 </file>
 
@@ -15470,6 +15665,13 @@
   <p:transition xmlns:p14="http://schemas.microsoft.com/office/powerpoint/2010/main" spd="slow">
     <p:cut/>
   </p:transition>
+  <p:timing>
+    <p:tnLst>
+      <p:par>
+        <p:cTn xmlns:p14="http://schemas.microsoft.com/office/powerpoint/2010/main" id="1" dur="indefinite" restart="never" nodeType="tmRoot"/>
+      </p:par>
+    </p:tnLst>
+  </p:timing>
 </p:sld>
 </file>
 
@@ -15746,6 +15948,13 @@
   <p:transition xmlns:p14="http://schemas.microsoft.com/office/powerpoint/2010/main" spd="slow">
     <p:cut/>
   </p:transition>
+  <p:timing>
+    <p:tnLst>
+      <p:par>
+        <p:cTn xmlns:p14="http://schemas.microsoft.com/office/powerpoint/2010/main" id="1" dur="indefinite" restart="never" nodeType="tmRoot"/>
+      </p:par>
+    </p:tnLst>
+  </p:timing>
 </p:sld>
 </file>
 
@@ -15951,6 +16160,13 @@
   <p:transition xmlns:p14="http://schemas.microsoft.com/office/powerpoint/2010/main" spd="slow">
     <p:cut/>
   </p:transition>
+  <p:timing>
+    <p:tnLst>
+      <p:par>
+        <p:cTn xmlns:p14="http://schemas.microsoft.com/office/powerpoint/2010/main" id="1" dur="indefinite" restart="never" nodeType="tmRoot"/>
+      </p:par>
+    </p:tnLst>
+  </p:timing>
 </p:sld>
 </file>
 
@@ -16157,6 +16373,13 @@
   <p:transition xmlns:p14="http://schemas.microsoft.com/office/powerpoint/2010/main" spd="slow">
     <p:cut/>
   </p:transition>
+  <p:timing>
+    <p:tnLst>
+      <p:par>
+        <p:cTn xmlns:p14="http://schemas.microsoft.com/office/powerpoint/2010/main" id="1" dur="indefinite" restart="never" nodeType="tmRoot"/>
+      </p:par>
+    </p:tnLst>
+  </p:timing>
 </p:sld>
 </file>
 
@@ -16363,6 +16586,13 @@
   <p:transition xmlns:p14="http://schemas.microsoft.com/office/powerpoint/2010/main" spd="slow">
     <p:cut/>
   </p:transition>
+  <p:timing>
+    <p:tnLst>
+      <p:par>
+        <p:cTn xmlns:p14="http://schemas.microsoft.com/office/powerpoint/2010/main" id="1" dur="indefinite" restart="never" nodeType="tmRoot"/>
+      </p:par>
+    </p:tnLst>
+  </p:timing>
 </p:sld>
 </file>
 
@@ -16643,6 +16873,13 @@
   <p:transition xmlns:p14="http://schemas.microsoft.com/office/powerpoint/2010/main" spd="slow">
     <p:cut/>
   </p:transition>
+  <p:timing>
+    <p:tnLst>
+      <p:par>
+        <p:cTn xmlns:p14="http://schemas.microsoft.com/office/powerpoint/2010/main" id="1" dur="indefinite" restart="never" nodeType="tmRoot"/>
+      </p:par>
+    </p:tnLst>
+  </p:timing>
 </p:sld>
 </file>
 
@@ -16867,7 +17104,7 @@
         </p:blipFill>
         <p:spPr>
           <a:xfrm>
-            <a:off x="3554592" y="2986725"/>
+            <a:off x="3441924" y="3058412"/>
             <a:ext cx="571500" cy="571500"/>
           </a:xfrm>
           <a:prstGeom prst="rect">
@@ -16887,6 +17124,13 @@
   <p:transition xmlns:p14="http://schemas.microsoft.com/office/powerpoint/2010/main" spd="slow">
     <p:cut/>
   </p:transition>
+  <p:timing>
+    <p:tnLst>
+      <p:par>
+        <p:cTn xmlns:p14="http://schemas.microsoft.com/office/powerpoint/2010/main" id="1" dur="indefinite" restart="never" nodeType="tmRoot"/>
+      </p:par>
+    </p:tnLst>
+  </p:timing>
 </p:sld>
 </file>
 

</xml_diff>

<commit_message>
Minor notation changes, for haskellers.
</commit_message>
<xml_diff>
--- a/speakers/vpatryshev/intuitionistic-type-theory/IntroToIntuitionisticTypeTheory.pptx
+++ b/speakers/vpatryshev/intuitionistic-type-theory/IntroToIntuitionisticTypeTheory.pptx
@@ -3218,8 +3218,8 @@
         </p:nvSpPr>
         <p:spPr>
           <a:xfrm>
-            <a:off x="381187" y="685800"/>
-            <a:ext cx="6096299" cy="3429000"/>
+            <a:off x="381000" y="685800"/>
+            <a:ext cx="6096000" cy="3429000"/>
           </a:xfrm>
           <a:custGeom>
             <a:avLst/>
@@ -3329,8 +3329,8 @@
         </p:nvSpPr>
         <p:spPr>
           <a:xfrm>
-            <a:off x="381187" y="685800"/>
-            <a:ext cx="6096299" cy="3429000"/>
+            <a:off x="381000" y="685800"/>
+            <a:ext cx="6096000" cy="3429000"/>
           </a:xfrm>
           <a:custGeom>
             <a:avLst/>
@@ -4661,8 +4661,8 @@
         </p:nvSpPr>
         <p:spPr>
           <a:xfrm>
-            <a:off x="381187" y="685800"/>
-            <a:ext cx="6096299" cy="3429000"/>
+            <a:off x="381000" y="685800"/>
+            <a:ext cx="6096000" cy="3429000"/>
           </a:xfrm>
           <a:custGeom>
             <a:avLst/>
@@ -7557,25 +7557,7 @@
                 <a:cs typeface="Courier New"/>
                 <a:sym typeface="Courier New"/>
               </a:rPr>
-              <a:t>x</a:t>
-            </a:r>
-            <a:r>
-              <a:rPr lang="en" sz="2400" b="1" dirty="0">
-                <a:latin typeface="Courier New"/>
-                <a:ea typeface="Courier New"/>
-                <a:cs typeface="Courier New"/>
-                <a:sym typeface="Courier New"/>
-              </a:rPr>
-              <a:t>:⊤→</a:t>
-            </a:r>
-            <a:r>
-              <a:rPr lang="en" sz="2400" b="1" dirty="0">
-                <a:latin typeface="Courier New"/>
-                <a:ea typeface="Courier New"/>
-                <a:cs typeface="Courier New"/>
-                <a:sym typeface="Courier New"/>
-              </a:rPr>
-              <a:t>A</a:t>
+              <a:t>x:⊤→A</a:t>
             </a:r>
             <a:r>
               <a:rPr lang="en" sz="2400" dirty="0"/>
@@ -8674,7 +8656,7 @@
               <a:buNone/>
             </a:pPr>
             <a:r>
-              <a:rPr lang="en" sz="2400" b="1">
+              <a:rPr lang="en" sz="2400" b="1" dirty="0">
                 <a:latin typeface="Courier New"/>
                 <a:ea typeface="Courier New"/>
                 <a:cs typeface="Courier New"/>
@@ -8691,7 +8673,7 @@
               <a:buNone/>
             </a:pPr>
             <a:r>
-              <a:rPr lang="en" sz="2400" b="1">
+              <a:rPr lang="en" sz="2400" b="1" dirty="0">
                 <a:latin typeface="Courier New"/>
                 <a:ea typeface="Courier New"/>
                 <a:cs typeface="Courier New"/>
@@ -8700,7 +8682,7 @@
               <a:t> A → C</a:t>
             </a:r>
             <a:r>
-              <a:rPr lang="en" sz="2400" b="1" baseline="30000">
+              <a:rPr lang="en" sz="2400" b="1" baseline="30000" dirty="0">
                 <a:latin typeface="Courier New"/>
                 <a:ea typeface="Courier New"/>
                 <a:cs typeface="Courier New"/>
@@ -8717,11 +8699,11 @@
               <a:buNone/>
             </a:pPr>
             <a:r>
-              <a:rPr lang="en" sz="2400"/>
+              <a:rPr lang="en" sz="2400" dirty="0"/>
               <a:t>where </a:t>
             </a:r>
             <a:r>
-              <a:rPr lang="en" sz="2400" b="1">
+              <a:rPr lang="en" sz="2400" b="1" dirty="0">
                 <a:latin typeface="Courier New"/>
                 <a:ea typeface="Courier New"/>
                 <a:cs typeface="Courier New"/>
@@ -8730,7 +8712,7 @@
               <a:t>C</a:t>
             </a:r>
             <a:r>
-              <a:rPr lang="en" sz="2400" b="1" baseline="30000">
+              <a:rPr lang="en" sz="2400" b="1" baseline="30000" dirty="0">
                 <a:latin typeface="Courier New"/>
                 <a:ea typeface="Courier New"/>
                 <a:cs typeface="Courier New"/>
@@ -8739,11 +8721,11 @@
               <a:t>B</a:t>
             </a:r>
             <a:r>
-              <a:rPr lang="en" sz="2400"/>
+              <a:rPr lang="en" sz="2400" dirty="0"/>
               <a:t> is the “type of functions from </a:t>
             </a:r>
             <a:r>
-              <a:rPr lang="en" sz="2400" b="1">
+              <a:rPr lang="en" sz="2400" b="1" dirty="0">
                 <a:latin typeface="Courier New"/>
                 <a:ea typeface="Courier New"/>
                 <a:cs typeface="Courier New"/>
@@ -8752,11 +8734,11 @@
               <a:t>B</a:t>
             </a:r>
             <a:r>
-              <a:rPr lang="en" sz="2400"/>
+              <a:rPr lang="en" sz="2400" dirty="0"/>
               <a:t> to </a:t>
             </a:r>
             <a:r>
-              <a:rPr lang="en" sz="2400" b="1">
+              <a:rPr lang="en" sz="2400" b="1" dirty="0">
                 <a:latin typeface="Courier New"/>
                 <a:ea typeface="Courier New"/>
                 <a:cs typeface="Courier New"/>
@@ -8765,7 +8747,7 @@
               <a:t>C</a:t>
             </a:r>
             <a:r>
-              <a:rPr lang="en" sz="2400"/>
+              <a:rPr lang="en" sz="2400" dirty="0"/>
               <a:t>”</a:t>
             </a:r>
           </a:p>
@@ -8776,7 +8758,7 @@
               </a:spcBef>
               <a:buNone/>
             </a:pPr>
-            <a:endParaRPr sz="2400" baseline="30000">
+            <a:endParaRPr sz="2400" baseline="30000" dirty="0">
               <a:latin typeface="Courier New"/>
               <a:ea typeface="Courier New"/>
               <a:cs typeface="Courier New"/>
@@ -8791,11 +8773,11 @@
               <a:buNone/>
             </a:pPr>
             <a:r>
-              <a:rPr lang="en" sz="2400"/>
+              <a:rPr lang="en" sz="2400" dirty="0"/>
               <a:t>Now every function </a:t>
             </a:r>
             <a:r>
-              <a:rPr lang="en" sz="2400" b="1">
+              <a:rPr lang="en" sz="2400" b="1" dirty="0">
                 <a:latin typeface="Courier New"/>
                 <a:ea typeface="Courier New"/>
                 <a:cs typeface="Courier New"/>
@@ -8804,11 +8786,11 @@
               <a:t>B→C</a:t>
             </a:r>
             <a:r>
-              <a:rPr lang="en" sz="2400"/>
+              <a:rPr lang="en" sz="2400" dirty="0"/>
               <a:t> is an instance of </a:t>
             </a:r>
             <a:r>
-              <a:rPr lang="en" sz="2400" b="1">
+              <a:rPr lang="en" sz="2400" b="1" dirty="0">
                 <a:latin typeface="Courier New"/>
                 <a:ea typeface="Courier New"/>
                 <a:cs typeface="Courier New"/>
@@ -8817,7 +8799,7 @@
               <a:t>C</a:t>
             </a:r>
             <a:r>
-              <a:rPr lang="en" sz="2400" b="1" baseline="30000">
+              <a:rPr lang="en" sz="2400" b="1" baseline="30000" dirty="0">
                 <a:latin typeface="Courier New"/>
                 <a:ea typeface="Courier New"/>
                 <a:cs typeface="Courier New"/>
@@ -8826,7 +8808,7 @@
               <a:t>B</a:t>
             </a:r>
             <a:r>
-              <a:rPr lang="en" sz="2400"/>
+              <a:rPr lang="en" sz="2400" dirty="0"/>
               <a:t>:</a:t>
             </a:r>
           </a:p>
@@ -8838,7 +8820,7 @@
               <a:buNone/>
             </a:pPr>
             <a:r>
-              <a:rPr lang="en" sz="2400" b="1">
+              <a:rPr lang="en" sz="2400" b="1" dirty="0">
                 <a:solidFill>
                   <a:srgbClr val="999999"/>
                 </a:solidFill>
@@ -8850,7 +8832,7 @@
               <a:t>⊤×</a:t>
             </a:r>
             <a:r>
-              <a:rPr lang="en" sz="2400" b="1">
+              <a:rPr lang="en" sz="2400" b="1" dirty="0">
                 <a:latin typeface="Courier New"/>
                 <a:ea typeface="Courier New"/>
                 <a:cs typeface="Courier New"/>
@@ -8867,7 +8849,7 @@
               <a:buNone/>
             </a:pPr>
             <a:r>
-              <a:rPr lang="en" sz="2400" b="1">
+              <a:rPr lang="en" sz="2400" b="1" dirty="0">
                 <a:latin typeface="Courier New"/>
                 <a:ea typeface="Courier New"/>
                 <a:cs typeface="Courier New"/>
@@ -8876,7 +8858,7 @@
               <a:t> </a:t>
             </a:r>
             <a:r>
-              <a:rPr lang="en" sz="2400" b="1">
+              <a:rPr lang="en" sz="2400" b="1" dirty="0">
                 <a:solidFill>
                   <a:srgbClr val="999999"/>
                 </a:solidFill>
@@ -8888,16 +8870,25 @@
               <a:t>⊤</a:t>
             </a:r>
             <a:r>
-              <a:rPr lang="en" sz="2400" b="1">
-                <a:latin typeface="Courier New"/>
-                <a:ea typeface="Courier New"/>
-                <a:cs typeface="Courier New"/>
-                <a:sym typeface="Courier New"/>
-              </a:rPr>
-              <a:t> → C</a:t>
-            </a:r>
-            <a:r>
-              <a:rPr lang="en" sz="2400" b="1" baseline="30000">
+              <a:rPr lang="en" sz="2400" b="1" dirty="0">
+                <a:latin typeface="Courier New"/>
+                <a:ea typeface="Courier New"/>
+                <a:cs typeface="Courier New"/>
+                <a:sym typeface="Courier New"/>
+              </a:rPr>
+              <a:t> → </a:t>
+            </a:r>
+            <a:r>
+              <a:rPr lang="en" sz="2400" b="1" dirty="0" smtClean="0">
+                <a:latin typeface="Courier New"/>
+                <a:ea typeface="Courier New"/>
+                <a:cs typeface="Courier New"/>
+                <a:sym typeface="Courier New"/>
+              </a:rPr>
+              <a:t>C</a:t>
+            </a:r>
+            <a:r>
+              <a:rPr lang="en" sz="2400" b="1" baseline="30000" dirty="0" smtClean="0">
                 <a:latin typeface="Courier New"/>
                 <a:ea typeface="Courier New"/>
                 <a:cs typeface="Courier New"/>
@@ -8905,6 +8896,125 @@
               </a:rPr>
               <a:t>B</a:t>
             </a:r>
+            <a:endParaRPr lang="en-US" sz="2400" b="1" baseline="30000" dirty="0" smtClean="0">
+              <a:latin typeface="Courier New"/>
+              <a:ea typeface="Courier New"/>
+              <a:cs typeface="Courier New"/>
+              <a:sym typeface="Courier New"/>
+            </a:endParaRPr>
+          </a:p>
+          <a:p>
+            <a:pPr>
+              <a:spcBef>
+                <a:spcPts val="0"/>
+              </a:spcBef>
+              <a:buNone/>
+            </a:pPr>
+            <a:endParaRPr lang="en-US" sz="2400" b="1" baseline="30000" dirty="0" smtClean="0">
+              <a:latin typeface="Courier New"/>
+              <a:ea typeface="Courier New"/>
+              <a:cs typeface="Courier New"/>
+              <a:sym typeface="Courier New"/>
+            </a:endParaRPr>
+          </a:p>
+          <a:p>
+            <a:r>
+              <a:rPr lang="en-US" sz="2000" dirty="0" smtClean="0"/>
+              <a:t>Alternatively, we could denote </a:t>
+            </a:r>
+            <a:r>
+              <a:rPr lang="en" sz="2000" b="1" dirty="0" smtClean="0">
+                <a:latin typeface="Courier New"/>
+                <a:ea typeface="Courier New"/>
+                <a:cs typeface="Courier New"/>
+                <a:sym typeface="Courier New"/>
+              </a:rPr>
+              <a:t>C</a:t>
+            </a:r>
+            <a:r>
+              <a:rPr lang="en" sz="2000" b="1" baseline="30000" dirty="0" smtClean="0">
+                <a:latin typeface="Courier New"/>
+                <a:ea typeface="Courier New"/>
+                <a:cs typeface="Courier New"/>
+                <a:sym typeface="Courier New"/>
+              </a:rPr>
+              <a:t>B</a:t>
+            </a:r>
+            <a:r>
+              <a:rPr lang="en-US" sz="2000" dirty="0" smtClean="0"/>
+              <a:t> as </a:t>
+            </a:r>
+            <a:r>
+              <a:rPr lang="en" sz="2000" b="1" dirty="0" smtClean="0">
+                <a:latin typeface="Courier New"/>
+                <a:ea typeface="Courier New"/>
+                <a:cs typeface="Courier New"/>
+                <a:sym typeface="Courier New"/>
+              </a:rPr>
+              <a:t>B→C</a:t>
+            </a:r>
+            <a:r>
+              <a:rPr lang="en" sz="2000" dirty="0" smtClean="0"/>
+              <a:t> </a:t>
+            </a:r>
+            <a:r>
+              <a:rPr lang="en-US" sz="2000" dirty="0" smtClean="0"/>
+              <a:t>or as </a:t>
+            </a:r>
+            <a:r>
+              <a:rPr lang="en" sz="2000" b="1" dirty="0" smtClean="0">
+                <a:latin typeface="Courier New"/>
+                <a:ea typeface="Courier New"/>
+                <a:cs typeface="Courier New"/>
+                <a:sym typeface="Courier New"/>
+              </a:rPr>
+              <a:t>B</a:t>
+            </a:r>
+            <a:r>
+              <a:rPr lang="en" sz="2000" b="1" dirty="0" smtClean="0">
+                <a:solidFill>
+                  <a:schemeClr val="bg1">
+                    <a:lumMod val="25000"/>
+                  </a:schemeClr>
+                </a:solidFill>
+                <a:latin typeface="Courier New"/>
+                <a:ea typeface="Courier New"/>
+                <a:cs typeface="Courier New"/>
+                <a:sym typeface="Courier New"/>
+              </a:rPr>
+              <a:t>⇒</a:t>
+            </a:r>
+            <a:r>
+              <a:rPr lang="en" sz="2000" b="1" dirty="0" smtClean="0">
+                <a:latin typeface="Courier New"/>
+                <a:ea typeface="Courier New"/>
+                <a:cs typeface="Courier New"/>
+                <a:sym typeface="Courier New"/>
+              </a:rPr>
+              <a:t>C</a:t>
+            </a:r>
+            <a:endParaRPr lang="en-US" sz="2000" dirty="0" smtClean="0"/>
+          </a:p>
+          <a:p>
+            <a:r>
+              <a:rPr lang="en-US" sz="2000" dirty="0" smtClean="0"/>
+              <a:t>but this causes a lot of confusion</a:t>
+            </a:r>
+            <a:endParaRPr lang="en" sz="2000" dirty="0"/>
+          </a:p>
+          <a:p>
+            <a:pPr>
+              <a:spcBef>
+                <a:spcPts val="0"/>
+              </a:spcBef>
+              <a:buNone/>
+            </a:pPr>
+            <a:endParaRPr lang="en-US" sz="2400" b="1" baseline="30000" dirty="0">
+              <a:latin typeface="Courier New"/>
+              <a:ea typeface="Courier New"/>
+              <a:cs typeface="Courier New"/>
+              <a:sym typeface="Courier New"/>
+            </a:endParaRPr>
           </a:p>
         </p:txBody>
       </p:sp>
@@ -9387,21 +9497,46 @@
               <a:buNone/>
             </a:pPr>
             <a:r>
+              <a:rPr lang="en" sz="2400" dirty="0" smtClean="0"/>
+              <a:t>A</a:t>
+            </a:r>
+            <a:r>
+              <a:rPr lang="en-US" sz="2400" dirty="0" err="1" smtClean="0"/>
+              <a:t>ny</a:t>
+            </a:r>
+            <a:r>
+              <a:rPr lang="en" sz="2400" dirty="0" smtClean="0"/>
+              <a:t> </a:t>
+            </a:r>
+            <a:r>
               <a:rPr lang="en" sz="2400" dirty="0"/>
-              <a:t>A function </a:t>
-            </a:r>
-            <a:r>
-              <a:rPr lang="en" sz="2400" b="1" dirty="0">
-                <a:latin typeface="Courier New"/>
-                <a:ea typeface="Courier New"/>
-                <a:cs typeface="Courier New"/>
-                <a:sym typeface="Courier New"/>
-              </a:rPr>
-              <a:t>A→Ω</a:t>
+              <a:t>function </a:t>
+            </a:r>
+            <a:r>
+              <a:rPr lang="en-US" sz="2400" b="1" dirty="0" smtClean="0">
+                <a:latin typeface="Courier New"/>
+                <a:ea typeface="Courier New"/>
+                <a:cs typeface="Courier New"/>
+                <a:sym typeface="Courier New"/>
+              </a:rPr>
+              <a:t>p:A</a:t>
+            </a:r>
+            <a:r>
+              <a:rPr lang="en" sz="2400" b="1" dirty="0" smtClean="0">
+                <a:latin typeface="Courier New"/>
+                <a:ea typeface="Courier New"/>
+                <a:cs typeface="Courier New"/>
+                <a:sym typeface="Courier New"/>
+              </a:rPr>
+              <a:t>→Ω</a:t>
+            </a:r>
+            <a:r>
+              <a:rPr lang="en" sz="2400" dirty="0" smtClean="0"/>
+              <a:t> </a:t>
             </a:r>
             <a:r>
               <a:rPr lang="en" sz="2400" dirty="0"/>
-              <a:t> is called a </a:t>
+              <a:t>is called a </a:t>
             </a:r>
             <a:r>
               <a:rPr lang="en" sz="2400" i="1" dirty="0"/>
@@ -9671,11 +9806,11 @@
               <a:buNone/>
             </a:pPr>
             <a:r>
-              <a:rPr lang="en" sz="2400"/>
+              <a:rPr lang="en" sz="2400" dirty="0"/>
               <a:t>Type of all subtypes of </a:t>
             </a:r>
             <a:r>
-              <a:rPr lang="en" sz="2400" b="1">
+              <a:rPr lang="en" sz="2400" b="1" dirty="0">
                 <a:latin typeface="Courier New"/>
                 <a:ea typeface="Courier New"/>
                 <a:cs typeface="Courier New"/>
@@ -9684,11 +9819,11 @@
               <a:t>A</a:t>
             </a:r>
             <a:r>
-              <a:rPr lang="en" sz="2400"/>
+              <a:rPr lang="en" sz="2400" dirty="0"/>
               <a:t> is </a:t>
             </a:r>
             <a:r>
-              <a:rPr lang="en" sz="2400" b="1">
+              <a:rPr lang="en" sz="2400" b="1" dirty="0">
                 <a:latin typeface="Courier New"/>
                 <a:ea typeface="Courier New"/>
                 <a:cs typeface="Courier New"/>
@@ -9697,7 +9832,7 @@
               <a:t>Ω</a:t>
             </a:r>
             <a:r>
-              <a:rPr lang="en" sz="2400" b="1" baseline="30000">
+              <a:rPr lang="en" sz="2400" b="1" baseline="30000" dirty="0">
                 <a:latin typeface="Courier New"/>
                 <a:ea typeface="Courier New"/>
                 <a:cs typeface="Courier New"/>
@@ -9706,7 +9841,7 @@
               <a:t>A</a:t>
             </a:r>
             <a:r>
-              <a:rPr lang="en" sz="2400">
+              <a:rPr lang="en" sz="2400" dirty="0">
                 <a:latin typeface="Courier New"/>
                 <a:ea typeface="Courier New"/>
                 <a:cs typeface="Courier New"/>
@@ -9722,7 +9857,7 @@
               </a:spcBef>
               <a:buNone/>
             </a:pPr>
-            <a:endParaRPr sz="2400">
+            <a:endParaRPr sz="2400" dirty="0">
               <a:latin typeface="Courier New"/>
               <a:ea typeface="Courier New"/>
               <a:cs typeface="Courier New"/>
@@ -9737,7 +9872,7 @@
               <a:buNone/>
             </a:pPr>
             <a:r>
-              <a:rPr lang="en" sz="2400" b="1">
+              <a:rPr lang="en" sz="2400" b="1" dirty="0">
                 <a:latin typeface="Courier New"/>
                 <a:ea typeface="Courier New"/>
                 <a:cs typeface="Courier New"/>
@@ -9746,7 +9881,7 @@
               <a:t>  p:Ω</a:t>
             </a:r>
             <a:r>
-              <a:rPr lang="en" sz="2400" b="1" baseline="30000">
+              <a:rPr lang="en" sz="2400" b="1" baseline="30000" dirty="0">
                 <a:latin typeface="Courier New"/>
                 <a:ea typeface="Courier New"/>
                 <a:cs typeface="Courier New"/>
@@ -9763,7 +9898,7 @@
               <a:buNone/>
             </a:pPr>
             <a:r>
-              <a:rPr lang="en" sz="2400" b="1">
+              <a:rPr lang="en" sz="2400" b="1" dirty="0">
                 <a:latin typeface="Courier New"/>
                 <a:ea typeface="Courier New"/>
                 <a:cs typeface="Courier New"/>
@@ -9780,7 +9915,7 @@
               <a:buNone/>
             </a:pPr>
             <a:r>
-              <a:rPr lang="en" sz="2400" b="1">
+              <a:rPr lang="en" sz="2400" b="1" dirty="0">
                 <a:latin typeface="Courier New"/>
                 <a:ea typeface="Courier New"/>
                 <a:cs typeface="Courier New"/>
@@ -9789,7 +9924,7 @@
               <a:t>  A</a:t>
             </a:r>
             <a:r>
-              <a:rPr lang="en" sz="2400" b="1" baseline="-25000">
+              <a:rPr lang="en" sz="2400" b="1" baseline="-25000" dirty="0">
                 <a:latin typeface="Courier New"/>
                 <a:ea typeface="Courier New"/>
                 <a:cs typeface="Courier New"/>
@@ -9798,11 +9933,11 @@
               <a:t>1</a:t>
             </a:r>
             <a:r>
-              <a:rPr lang="en" sz="2400" b="1"/>
+              <a:rPr lang="en" sz="2400" b="1" dirty="0"/>
               <a:t>↣</a:t>
             </a:r>
             <a:r>
-              <a:rPr lang="en" sz="2400" b="1">
+              <a:rPr lang="en" sz="2400" b="1" dirty="0">
                 <a:latin typeface="Courier New"/>
                 <a:ea typeface="Courier New"/>
                 <a:cs typeface="Courier New"/>
@@ -9818,7 +9953,7 @@
               </a:spcBef>
               <a:buNone/>
             </a:pPr>
-            <a:endParaRPr sz="2400">
+            <a:endParaRPr sz="2400" dirty="0">
               <a:latin typeface="Courier New"/>
               <a:ea typeface="Courier New"/>
               <a:cs typeface="Courier New"/>
@@ -9833,11 +9968,11 @@
               <a:buNone/>
             </a:pPr>
             <a:r>
-              <a:rPr lang="en" sz="2400"/>
+              <a:rPr lang="en" sz="2400" dirty="0"/>
               <a:t>Each instance of </a:t>
             </a:r>
             <a:r>
-              <a:rPr lang="en" sz="2400" b="1">
+              <a:rPr lang="en" sz="2400" b="1" dirty="0">
                 <a:latin typeface="Courier New"/>
                 <a:ea typeface="Courier New"/>
                 <a:cs typeface="Courier New"/>
@@ -9846,7 +9981,7 @@
               <a:t>Ω</a:t>
             </a:r>
             <a:r>
-              <a:rPr lang="en" sz="2400" b="1" baseline="30000">
+              <a:rPr lang="en" sz="2400" b="1" baseline="30000" dirty="0">
                 <a:latin typeface="Courier New"/>
                 <a:ea typeface="Courier New"/>
                 <a:cs typeface="Courier New"/>
@@ -9855,7 +9990,7 @@
               <a:t>A</a:t>
             </a:r>
             <a:r>
-              <a:rPr lang="en" sz="2400">
+              <a:rPr lang="en" sz="2400" dirty="0">
                 <a:latin typeface="Courier New"/>
                 <a:ea typeface="Courier New"/>
                 <a:cs typeface="Courier New"/>
@@ -9864,11 +9999,11 @@
               <a:t> </a:t>
             </a:r>
             <a:r>
-              <a:rPr lang="en" sz="2400"/>
+              <a:rPr lang="en" sz="2400" dirty="0"/>
               <a:t>represents a subtype of </a:t>
             </a:r>
             <a:r>
-              <a:rPr lang="en" sz="2400" b="1">
+              <a:rPr lang="en" sz="2400" b="1" dirty="0">
                 <a:latin typeface="Courier New"/>
                 <a:ea typeface="Courier New"/>
                 <a:cs typeface="Courier New"/>
@@ -9884,7 +10019,7 @@
               </a:spcBef>
               <a:buNone/>
             </a:pPr>
-            <a:endParaRPr sz="2400">
+            <a:endParaRPr sz="2400" dirty="0">
               <a:latin typeface="Courier New"/>
               <a:ea typeface="Courier New"/>
               <a:cs typeface="Courier New"/>
@@ -9953,7 +10088,7 @@
         </p:nvSpPr>
         <p:spPr>
           <a:xfrm>
-            <a:off x="5410575" y="2429600"/>
+            <a:off x="5410575" y="1998898"/>
             <a:ext cx="2670899" cy="1068299"/>
           </a:xfrm>
           <a:prstGeom prst="roundRect">
@@ -9998,7 +10133,7 @@
         </p:nvSpPr>
         <p:spPr>
           <a:xfrm>
-            <a:off x="5578625" y="2429600"/>
+            <a:off x="5578625" y="1990467"/>
             <a:ext cx="2502899" cy="1068299"/>
           </a:xfrm>
           <a:prstGeom prst="rect">
@@ -10022,7 +10157,7 @@
               <a:buNone/>
             </a:pPr>
             <a:r>
-              <a:rPr lang="en" sz="1800" b="1">
+              <a:rPr lang="en" sz="1800" b="1" dirty="0">
                 <a:solidFill>
                   <a:srgbClr val="1C4587"/>
                 </a:solidFill>
@@ -10041,7 +10176,7 @@
               </a:spcBef>
               <a:buNone/>
             </a:pPr>
-            <a:endParaRPr sz="1800" b="1">
+            <a:endParaRPr sz="1800" b="1" dirty="0">
               <a:solidFill>
                 <a:srgbClr val="1C4587"/>
               </a:solidFill>
@@ -10059,7 +10194,7 @@
               <a:buNone/>
             </a:pPr>
             <a:r>
-              <a:rPr lang="en" sz="1800" b="1">
+              <a:rPr lang="en" sz="1800" b="1" dirty="0">
                 <a:solidFill>
                   <a:srgbClr val="1C4587"/>
                 </a:solidFill>
@@ -10071,7 +10206,7 @@
               <a:t>A</a:t>
             </a:r>
             <a:r>
-              <a:rPr lang="en" sz="1800" b="1" baseline="-25000">
+              <a:rPr lang="en" sz="1800" b="1" baseline="-25000" dirty="0">
                 <a:solidFill>
                   <a:srgbClr val="1C4587"/>
                 </a:solidFill>
@@ -10083,7 +10218,7 @@
               <a:t>p</a:t>
             </a:r>
             <a:r>
-              <a:rPr lang="en" sz="1800" b="1">
+              <a:rPr lang="en" sz="1800" b="1" dirty="0">
                 <a:solidFill>
                   <a:srgbClr val="1C4587"/>
                 </a:solidFill>
@@ -12028,7 +12163,19 @@
             </a:pPr>
             <a:r>
               <a:rPr lang="en" sz="2400" dirty="0"/>
-              <a:t>Empty type: </a:t>
+              <a:t>Empty </a:t>
+            </a:r>
+            <a:r>
+              <a:rPr lang="en" sz="2400" dirty="0" smtClean="0"/>
+              <a:t>type</a:t>
+            </a:r>
+            <a:r>
+              <a:rPr lang="en-US" sz="2400" dirty="0" smtClean="0"/>
+              <a:t>, aka</a:t>
+            </a:r>
+            <a:r>
+              <a:rPr lang="en" sz="2400" dirty="0" smtClean="0"/>
+              <a:t> </a:t>
             </a:r>
             <a:r>
               <a:rPr lang="en" sz="2400" b="1" dirty="0">
@@ -12091,7 +12238,7 @@
               <a:t>for each </a:t>
             </a:r>
             <a:r>
-              <a:rPr lang="en" sz="2400" b="1" dirty="0">
+              <a:rPr lang="en" sz="2400" b="1" dirty="0" smtClean="0">
                 <a:latin typeface="Courier New"/>
                 <a:ea typeface="Courier New"/>
                 <a:cs typeface="Courier New"/>
@@ -12099,6 +12246,26 @@
               </a:rPr>
               <a:t>A</a:t>
             </a:r>
+            <a:endParaRPr lang="en-US" sz="2400" b="1" dirty="0" smtClean="0">
+              <a:latin typeface="Courier New"/>
+              <a:ea typeface="Courier New"/>
+              <a:cs typeface="Courier New"/>
+              <a:sym typeface="Courier New"/>
+            </a:endParaRPr>
+          </a:p>
+          <a:p>
+            <a:pPr rtl="0">
+              <a:spcBef>
+                <a:spcPts val="0"/>
+              </a:spcBef>
+              <a:buNone/>
+            </a:pPr>
+            <a:endParaRPr lang="en" sz="2400" b="1" dirty="0">
+              <a:latin typeface="Courier New"/>
+              <a:ea typeface="Courier New"/>
+              <a:cs typeface="Courier New"/>
+              <a:sym typeface="Courier New"/>
+            </a:endParaRPr>
           </a:p>
           <a:p>
             <a:pPr rtl="0">
@@ -12246,7 +12413,7 @@
         </p:blipFill>
         <p:spPr>
           <a:xfrm>
-            <a:off x="3682582" y="2312659"/>
+            <a:off x="3682582" y="2621240"/>
             <a:ext cx="1766433" cy="503594"/>
           </a:xfrm>
           <a:prstGeom prst="rect">
@@ -12274,7 +12441,7 @@
         </p:blipFill>
         <p:spPr>
           <a:xfrm>
-            <a:off x="3754280" y="2816253"/>
+            <a:off x="3798066" y="3181930"/>
             <a:ext cx="1479642" cy="322694"/>
           </a:xfrm>
           <a:prstGeom prst="rect">
@@ -12302,7 +12469,7 @@
         </p:blipFill>
         <p:spPr>
           <a:xfrm>
-            <a:off x="3551866" y="3138947"/>
+            <a:off x="3468780" y="3572791"/>
             <a:ext cx="2358062" cy="302001"/>
           </a:xfrm>
           <a:prstGeom prst="rect">
@@ -13335,7 +13502,7 @@
               <a:buNone/>
             </a:pPr>
             <a:r>
-              <a:rPr lang="en"/>
+              <a:rPr lang="en" dirty="0"/>
               <a:t>Negation</a:t>
             </a:r>
           </a:p>
@@ -13347,7 +13514,7 @@
               <a:buNone/>
             </a:pPr>
             <a:r>
-              <a:rPr lang="en" sz="2400" b="1">
+              <a:rPr lang="en" sz="2400" b="1" dirty="0">
                 <a:solidFill>
                   <a:srgbClr val="000000"/>
                 </a:solidFill>
@@ -13366,7 +13533,7 @@
               </a:spcBef>
               <a:buNone/>
             </a:pPr>
-            <a:endParaRPr sz="2400">
+            <a:endParaRPr sz="2400" dirty="0">
               <a:solidFill>
                 <a:srgbClr val="000000"/>
               </a:solidFill>
@@ -13384,11 +13551,11 @@
               <a:buNone/>
             </a:pPr>
             <a:r>
-              <a:rPr lang="en" sz="2400"/>
+              <a:rPr lang="en" sz="2400" dirty="0"/>
               <a:t>can prove </a:t>
             </a:r>
             <a:r>
-              <a:rPr lang="en" sz="2400" b="1">
+              <a:rPr lang="en" sz="2400" b="1" dirty="0">
                 <a:solidFill>
                   <a:srgbClr val="000000"/>
                 </a:solidFill>
@@ -13408,11 +13575,11 @@
               <a:buNone/>
             </a:pPr>
             <a:r>
-              <a:rPr lang="en" sz="2400"/>
+              <a:rPr lang="en" sz="2400" dirty="0"/>
               <a:t>but not necessarily </a:t>
             </a:r>
             <a:r>
-              <a:rPr lang="en" sz="2400" b="1">
+              <a:rPr lang="en" sz="2400" b="1" dirty="0">
                 <a:solidFill>
                   <a:srgbClr val="000000"/>
                 </a:solidFill>
@@ -13431,7 +13598,7 @@
               </a:spcBef>
               <a:buNone/>
             </a:pPr>
-            <a:endParaRPr/>
+            <a:endParaRPr dirty="0"/>
           </a:p>
         </p:txBody>
       </p:sp>
@@ -14813,6 +14980,15 @@
               </a:spcBef>
               <a:buNone/>
             </a:pPr>
+            <a:endParaRPr lang="en-US" sz="2400" dirty="0" smtClean="0"/>
+          </a:p>
+          <a:p>
+            <a:pPr rtl="0">
+              <a:spcBef>
+                <a:spcPts val="0"/>
+              </a:spcBef>
+              <a:buNone/>
+            </a:pPr>
             <a:endParaRPr lang="en" sz="2400" dirty="0"/>
           </a:p>
           <a:p>
@@ -14854,7 +15030,7 @@
         </p:blipFill>
         <p:spPr>
           <a:xfrm>
-            <a:off x="4057977" y="2147875"/>
+            <a:off x="1879915" y="2486127"/>
             <a:ext cx="4352923" cy="293849"/>
           </a:xfrm>
           <a:prstGeom prst="rect">
@@ -14882,7 +15058,7 @@
         </p:blipFill>
         <p:spPr>
           <a:xfrm>
-            <a:off x="2548902" y="3246209"/>
+            <a:off x="2548902" y="3485825"/>
             <a:ext cx="3018149" cy="1440024"/>
           </a:xfrm>
           <a:prstGeom prst="rect">
@@ -14999,7 +15175,7 @@
               <a:buNone/>
             </a:pPr>
             <a:r>
-              <a:rPr lang="en" sz="2400"/>
+              <a:rPr lang="en" sz="2400" dirty="0"/>
               <a:t>Given a partial map…</a:t>
             </a:r>
           </a:p>
@@ -15010,7 +15186,7 @@
               </a:spcBef>
               <a:buNone/>
             </a:pPr>
-            <a:endParaRPr sz="2400"/>
+            <a:endParaRPr sz="2400" dirty="0"/>
           </a:p>
           <a:p>
             <a:pPr rtl="0">
@@ -15019,7 +15195,7 @@
               </a:spcBef>
               <a:buNone/>
             </a:pPr>
-            <a:endParaRPr sz="2400"/>
+            <a:endParaRPr sz="2400" dirty="0"/>
           </a:p>
           <a:p>
             <a:pPr rtl="0">
@@ -15028,7 +15204,7 @@
               </a:spcBef>
               <a:buNone/>
             </a:pPr>
-            <a:endParaRPr sz="2400"/>
+            <a:endParaRPr sz="2400" dirty="0"/>
           </a:p>
           <a:p>
             <a:pPr rtl="0">
@@ -15037,7 +15213,7 @@
               </a:spcBef>
               <a:buNone/>
             </a:pPr>
-            <a:endParaRPr sz="2400"/>
+            <a:endParaRPr sz="2400" dirty="0"/>
           </a:p>
           <a:p>
             <a:pPr rtl="0">
@@ -15046,8 +15222,22 @@
               </a:spcBef>
               <a:buNone/>
             </a:pPr>
-            <a:r>
-              <a:rPr lang="en" sz="2400" b="1">
+            <a:endParaRPr lang="en-US" sz="2400" b="1" dirty="0" smtClean="0">
+              <a:latin typeface="Courier New"/>
+              <a:ea typeface="Courier New"/>
+              <a:cs typeface="Courier New"/>
+              <a:sym typeface="Courier New"/>
+            </a:endParaRPr>
+          </a:p>
+          <a:p>
+            <a:pPr rtl="0">
+              <a:spcBef>
+                <a:spcPts val="0"/>
+              </a:spcBef>
+              <a:buNone/>
+            </a:pPr>
+            <a:r>
+              <a:rPr lang="en" sz="2400" b="1" dirty="0" smtClean="0">
                 <a:latin typeface="Courier New"/>
                 <a:ea typeface="Courier New"/>
                 <a:cs typeface="Courier New"/>
@@ -15056,7 +15246,7 @@
               <a:t>Y</a:t>
             </a:r>
             <a:r>
-              <a:rPr lang="en" b="1" baseline="30000">
+              <a:rPr lang="en" b="1" baseline="30000" dirty="0">
                 <a:latin typeface="Courier New"/>
                 <a:ea typeface="Courier New"/>
                 <a:cs typeface="Courier New"/>
@@ -15065,11 +15255,11 @@
               <a:t>~</a:t>
             </a:r>
             <a:r>
-              <a:rPr lang="en" sz="2400"/>
+              <a:rPr lang="en" sz="2400" dirty="0"/>
               <a:t> is not necessarily </a:t>
             </a:r>
             <a:r>
-              <a:rPr lang="en" sz="2400" b="1">
+              <a:rPr lang="en" sz="2400" b="1" dirty="0">
                 <a:latin typeface="Courier New"/>
                 <a:ea typeface="Courier New"/>
                 <a:cs typeface="Courier New"/>
@@ -15085,7 +15275,7 @@
               </a:spcBef>
               <a:buNone/>
             </a:pPr>
-            <a:endParaRPr/>
+            <a:endParaRPr dirty="0"/>
           </a:p>
         </p:txBody>
       </p:sp>
@@ -15215,24 +15405,150 @@
           </a:bodyPr>
           <a:lstStyle/>
           <a:p>
+            <a:r>
+              <a:rPr lang="en" sz="2400" b="1" dirty="0">
+                <a:latin typeface="Courier New"/>
+                <a:ea typeface="Lobster"/>
+                <a:cs typeface="Courier New"/>
+                <a:sym typeface="Lobster"/>
+              </a:rPr>
+              <a:t>Set</a:t>
+            </a:r>
+            <a:r>
+              <a:rPr lang="en" sz="2400" dirty="0" smtClean="0"/>
+              <a:t> </a:t>
+            </a:r>
+            <a:r>
+              <a:rPr lang="en" sz="2400" dirty="0"/>
+              <a:t>is trivial (our old Boolean stuff)</a:t>
+            </a:r>
+          </a:p>
+          <a:p>
             <a:pPr rtl="0">
               <a:spcBef>
                 <a:spcPts val="0"/>
               </a:spcBef>
               <a:buNone/>
             </a:pPr>
-            <a:r>
-              <a:rPr lang="en" sz="2400">
+            <a:endParaRPr sz="2400" dirty="0"/>
+          </a:p>
+          <a:p>
+            <a:pPr rtl="0">
+              <a:spcBef>
+                <a:spcPts val="0"/>
+              </a:spcBef>
+              <a:buNone/>
+            </a:pPr>
+            <a:r>
+              <a:rPr lang="en" sz="2400" b="1" dirty="0">
+                <a:latin typeface="Courier New"/>
+                <a:ea typeface="Lobster"/>
+                <a:cs typeface="Courier New"/>
+                <a:sym typeface="Lobster"/>
+              </a:rPr>
+              <a:t>Set</a:t>
+            </a:r>
+            <a:r>
+              <a:rPr lang="en" sz="2400" b="1" baseline="30000" dirty="0">
+                <a:latin typeface="Courier New"/>
+                <a:ea typeface="Abril Fatface"/>
+                <a:cs typeface="Courier New"/>
+                <a:sym typeface="Abril Fatface"/>
+              </a:rPr>
+              <a:t>2</a:t>
+            </a:r>
+            <a:r>
+              <a:rPr lang="en" sz="2400" dirty="0">
                 <a:latin typeface="Lobster"/>
                 <a:ea typeface="Lobster"/>
                 <a:cs typeface="Lobster"/>
                 <a:sym typeface="Lobster"/>
               </a:rPr>
-              <a:t>Set</a:t>
-            </a:r>
-            <a:r>
-              <a:rPr lang="en" sz="2400"/>
-              <a:t> is trivial (our old Boolean stuff)</a:t>
+              <a:t> </a:t>
+            </a:r>
+            <a:r>
+              <a:rPr lang="en" sz="2400" b="1" dirty="0">
+                <a:latin typeface="Courier New"/>
+                <a:ea typeface="Courier New"/>
+                <a:cs typeface="Courier New"/>
+                <a:sym typeface="Courier New"/>
+              </a:rPr>
+              <a:t>A:A</a:t>
+            </a:r>
+            <a:r>
+              <a:rPr lang="en" sz="2400" b="1" baseline="-25000" dirty="0">
+                <a:latin typeface="Courier New"/>
+                <a:ea typeface="Courier New"/>
+                <a:cs typeface="Courier New"/>
+                <a:sym typeface="Courier New"/>
+              </a:rPr>
+              <a:t>0</a:t>
+            </a:r>
+            <a:r>
+              <a:rPr lang="en" sz="2400" b="1" dirty="0">
+                <a:latin typeface="Courier New"/>
+                <a:ea typeface="Courier New"/>
+                <a:cs typeface="Courier New"/>
+                <a:sym typeface="Courier New"/>
+              </a:rPr>
+              <a:t>→A</a:t>
+            </a:r>
+            <a:r>
+              <a:rPr lang="en" sz="2400" b="1" baseline="-25000" dirty="0">
+                <a:latin typeface="Courier New"/>
+                <a:ea typeface="Courier New"/>
+                <a:cs typeface="Courier New"/>
+                <a:sym typeface="Courier New"/>
+              </a:rPr>
+              <a:t>1</a:t>
+            </a:r>
+            <a:r>
+              <a:rPr lang="en" sz="2400" dirty="0"/>
+              <a:t>, where </a:t>
+            </a:r>
+            <a:r>
+              <a:rPr lang="en" sz="2400" b="1" dirty="0">
+                <a:latin typeface="Courier New"/>
+                <a:ea typeface="Courier New"/>
+                <a:cs typeface="Courier New"/>
+                <a:sym typeface="Courier New"/>
+              </a:rPr>
+              <a:t>A</a:t>
+            </a:r>
+            <a:r>
+              <a:rPr lang="en" sz="2400" b="1" baseline="-25000" dirty="0">
+                <a:latin typeface="Courier New"/>
+                <a:ea typeface="Courier New"/>
+                <a:cs typeface="Courier New"/>
+                <a:sym typeface="Courier New"/>
+              </a:rPr>
+              <a:t>0</a:t>
+            </a:r>
+            <a:r>
+              <a:rPr lang="en" sz="2400" dirty="0"/>
+              <a:t> and </a:t>
+            </a:r>
+            <a:r>
+              <a:rPr lang="en" sz="2400" b="1" dirty="0">
+                <a:latin typeface="Courier New"/>
+                <a:ea typeface="Courier New"/>
+                <a:cs typeface="Courier New"/>
+                <a:sym typeface="Courier New"/>
+              </a:rPr>
+              <a:t>A</a:t>
+            </a:r>
+            <a:r>
+              <a:rPr lang="en" sz="2400" b="1" baseline="-25000" dirty="0">
+                <a:latin typeface="Courier New"/>
+                <a:ea typeface="Courier New"/>
+                <a:cs typeface="Courier New"/>
+                <a:sym typeface="Courier New"/>
+              </a:rPr>
+              <a:t>1</a:t>
+            </a:r>
+            <a:r>
+              <a:rPr lang="en" sz="2400" dirty="0"/>
+              <a:t> are sets</a:t>
             </a:r>
           </a:p>
           <a:p>
@@ -15242,7 +15558,7 @@
               </a:spcBef>
               <a:buNone/>
             </a:pPr>
-            <a:endParaRPr sz="2400"/>
+            <a:endParaRPr sz="2400" dirty="0"/>
           </a:p>
           <a:p>
             <a:pPr rtl="0">
@@ -15252,43 +15568,33 @@
               <a:buNone/>
             </a:pPr>
             <a:r>
-              <a:rPr lang="en" sz="2400">
-                <a:latin typeface="Lobster"/>
-                <a:ea typeface="Lobster"/>
-                <a:cs typeface="Lobster"/>
-                <a:sym typeface="Lobster"/>
-              </a:rPr>
-              <a:t>Set</a:t>
-            </a:r>
-            <a:r>
-              <a:rPr lang="en" sz="2400" b="1" baseline="30000">
-                <a:latin typeface="Abril Fatface"/>
-                <a:ea typeface="Abril Fatface"/>
-                <a:cs typeface="Abril Fatface"/>
-                <a:sym typeface="Abril Fatface"/>
-              </a:rPr>
-              <a:t>2</a:t>
-            </a:r>
-            <a:r>
-              <a:rPr lang="en" sz="2400">
-                <a:latin typeface="Lobster"/>
-                <a:ea typeface="Lobster"/>
-                <a:cs typeface="Lobster"/>
-                <a:sym typeface="Lobster"/>
-              </a:rPr>
-              <a:t> </a:t>
-            </a:r>
-            <a:r>
-              <a:rPr lang="en" sz="2400" b="1">
-                <a:latin typeface="Courier New"/>
-                <a:ea typeface="Courier New"/>
-                <a:cs typeface="Courier New"/>
-                <a:sym typeface="Courier New"/>
-              </a:rPr>
-              <a:t>A:A</a:t>
-            </a:r>
-            <a:r>
-              <a:rPr lang="en" sz="2400" b="1" baseline="-25000">
+              <a:rPr lang="en" sz="2400" dirty="0"/>
+              <a:t>Subtype </a:t>
+            </a:r>
+            <a:r>
+              <a:rPr lang="en" sz="2400" b="1" dirty="0">
+                <a:latin typeface="Courier New"/>
+                <a:ea typeface="Courier New"/>
+                <a:cs typeface="Courier New"/>
+                <a:sym typeface="Courier New"/>
+              </a:rPr>
+              <a:t>A↣B</a:t>
+            </a:r>
+            <a:r>
+              <a:rPr lang="en" sz="2400" dirty="0"/>
+              <a:t>: </a:t>
+            </a:r>
+            <a:r>
+              <a:rPr lang="en" sz="2400" b="1" dirty="0">
+                <a:latin typeface="Courier New"/>
+                <a:ea typeface="Courier New"/>
+                <a:cs typeface="Courier New"/>
+                <a:sym typeface="Courier New"/>
+              </a:rPr>
+              <a:t>A</a:t>
+            </a:r>
+            <a:r>
+              <a:rPr lang="en" sz="2400" b="1" baseline="-25000" dirty="0">
                 <a:latin typeface="Courier New"/>
                 <a:ea typeface="Courier New"/>
                 <a:cs typeface="Courier New"/>
@@ -15297,16 +15603,38 @@
               <a:t>0</a:t>
             </a:r>
             <a:r>
-              <a:rPr lang="en" sz="2400" b="1">
-                <a:latin typeface="Courier New"/>
-                <a:ea typeface="Courier New"/>
-                <a:cs typeface="Courier New"/>
-                <a:sym typeface="Courier New"/>
-              </a:rPr>
-              <a:t>→A</a:t>
-            </a:r>
-            <a:r>
-              <a:rPr lang="en" sz="2400" b="1" baseline="-25000">
+              <a:rPr lang="en" sz="2400" b="1" dirty="0">
+                <a:latin typeface="Courier New"/>
+                <a:ea typeface="Courier New"/>
+                <a:cs typeface="Courier New"/>
+                <a:sym typeface="Courier New"/>
+              </a:rPr>
+              <a:t>↣B</a:t>
+            </a:r>
+            <a:r>
+              <a:rPr lang="en" sz="2400" b="1" baseline="-25000" dirty="0">
+                <a:latin typeface="Courier New"/>
+                <a:ea typeface="Courier New"/>
+                <a:cs typeface="Courier New"/>
+                <a:sym typeface="Courier New"/>
+              </a:rPr>
+              <a:t>0</a:t>
+            </a:r>
+            <a:r>
+              <a:rPr lang="en" sz="2400" dirty="0"/>
+              <a:t> and </a:t>
+            </a:r>
+            <a:r>
+              <a:rPr lang="en" sz="2400" b="1" dirty="0">
+                <a:latin typeface="Courier New"/>
+                <a:ea typeface="Courier New"/>
+                <a:cs typeface="Courier New"/>
+                <a:sym typeface="Courier New"/>
+              </a:rPr>
+              <a:t>A</a:t>
+            </a:r>
+            <a:r>
+              <a:rPr lang="en" sz="2400" b="1" baseline="-25000" dirty="0">
                 <a:latin typeface="Courier New"/>
                 <a:ea typeface="Courier New"/>
                 <a:cs typeface="Courier New"/>
@@ -15315,42 +15643,16 @@
               <a:t>1</a:t>
             </a:r>
             <a:r>
-              <a:rPr lang="en" sz="2400"/>
-              <a:t>, where </a:t>
-            </a:r>
-            <a:r>
-              <a:rPr lang="en" sz="2400" b="1">
-                <a:latin typeface="Courier New"/>
-                <a:ea typeface="Courier New"/>
-                <a:cs typeface="Courier New"/>
-                <a:sym typeface="Courier New"/>
-              </a:rPr>
-              <a:t>A</a:t>
-            </a:r>
-            <a:r>
-              <a:rPr lang="en" sz="2400" b="1" baseline="-25000">
-                <a:latin typeface="Courier New"/>
-                <a:ea typeface="Courier New"/>
-                <a:cs typeface="Courier New"/>
-                <a:sym typeface="Courier New"/>
-              </a:rPr>
-              <a:t>0</a:t>
-            </a:r>
-            <a:r>
-              <a:rPr lang="en" sz="2400"/>
-              <a:t> and </a:t>
-            </a:r>
-            <a:r>
-              <a:rPr lang="en" sz="2400" b="1">
-                <a:latin typeface="Courier New"/>
-                <a:ea typeface="Courier New"/>
-                <a:cs typeface="Courier New"/>
-                <a:sym typeface="Courier New"/>
-              </a:rPr>
-              <a:t>A</a:t>
-            </a:r>
-            <a:r>
-              <a:rPr lang="en" sz="2400" b="1" baseline="-25000">
+              <a:rPr lang="en" sz="2400" b="1" dirty="0">
+                <a:latin typeface="Courier New"/>
+                <a:ea typeface="Courier New"/>
+                <a:cs typeface="Courier New"/>
+                <a:sym typeface="Courier New"/>
+              </a:rPr>
+              <a:t>↣B</a:t>
+            </a:r>
+            <a:r>
+              <a:rPr lang="en" sz="2400" b="1" baseline="-25000" dirty="0">
                 <a:latin typeface="Courier New"/>
                 <a:ea typeface="Courier New"/>
                 <a:cs typeface="Courier New"/>
@@ -15359,8 +15661,8 @@
               <a:t>1</a:t>
             </a:r>
             <a:r>
-              <a:rPr lang="en" sz="2400"/>
-              <a:t> are sets</a:t>
+              <a:rPr lang="en" sz="2400" dirty="0"/>
+              <a:t> (compatible) </a:t>
             </a:r>
           </a:p>
           <a:p>
@@ -15370,121 +15672,7 @@
               </a:spcBef>
               <a:buNone/>
             </a:pPr>
-            <a:endParaRPr sz="2400"/>
-          </a:p>
-          <a:p>
-            <a:pPr rtl="0">
-              <a:spcBef>
-                <a:spcPts val="0"/>
-              </a:spcBef>
-              <a:buNone/>
-            </a:pPr>
-            <a:r>
-              <a:rPr lang="en" sz="2400"/>
-              <a:t>Subtype </a:t>
-            </a:r>
-            <a:r>
-              <a:rPr lang="en" sz="2400" b="1">
-                <a:latin typeface="Courier New"/>
-                <a:ea typeface="Courier New"/>
-                <a:cs typeface="Courier New"/>
-                <a:sym typeface="Courier New"/>
-              </a:rPr>
-              <a:t>A↣B</a:t>
-            </a:r>
-            <a:r>
-              <a:rPr lang="en" sz="2400"/>
-              <a:t>: </a:t>
-            </a:r>
-            <a:r>
-              <a:rPr lang="en" sz="2400" b="1">
-                <a:latin typeface="Courier New"/>
-                <a:ea typeface="Courier New"/>
-                <a:cs typeface="Courier New"/>
-                <a:sym typeface="Courier New"/>
-              </a:rPr>
-              <a:t>A</a:t>
-            </a:r>
-            <a:r>
-              <a:rPr lang="en" sz="2400" b="1" baseline="-25000">
-                <a:latin typeface="Courier New"/>
-                <a:ea typeface="Courier New"/>
-                <a:cs typeface="Courier New"/>
-                <a:sym typeface="Courier New"/>
-              </a:rPr>
-              <a:t>0</a:t>
-            </a:r>
-            <a:r>
-              <a:rPr lang="en" sz="2400" b="1">
-                <a:latin typeface="Courier New"/>
-                <a:ea typeface="Courier New"/>
-                <a:cs typeface="Courier New"/>
-                <a:sym typeface="Courier New"/>
-              </a:rPr>
-              <a:t>↣B</a:t>
-            </a:r>
-            <a:r>
-              <a:rPr lang="en" sz="2400" b="1" baseline="-25000">
-                <a:latin typeface="Courier New"/>
-                <a:ea typeface="Courier New"/>
-                <a:cs typeface="Courier New"/>
-                <a:sym typeface="Courier New"/>
-              </a:rPr>
-              <a:t>0</a:t>
-            </a:r>
-            <a:r>
-              <a:rPr lang="en" sz="2400"/>
-              <a:t> and </a:t>
-            </a:r>
-            <a:r>
-              <a:rPr lang="en" sz="2400" b="1">
-                <a:latin typeface="Courier New"/>
-                <a:ea typeface="Courier New"/>
-                <a:cs typeface="Courier New"/>
-                <a:sym typeface="Courier New"/>
-              </a:rPr>
-              <a:t>A</a:t>
-            </a:r>
-            <a:r>
-              <a:rPr lang="en" sz="2400" b="1" baseline="-25000">
-                <a:latin typeface="Courier New"/>
-                <a:ea typeface="Courier New"/>
-                <a:cs typeface="Courier New"/>
-                <a:sym typeface="Courier New"/>
-              </a:rPr>
-              <a:t>1</a:t>
-            </a:r>
-            <a:r>
-              <a:rPr lang="en" sz="2400" b="1">
-                <a:latin typeface="Courier New"/>
-                <a:ea typeface="Courier New"/>
-                <a:cs typeface="Courier New"/>
-                <a:sym typeface="Courier New"/>
-              </a:rPr>
-              <a:t>↣B</a:t>
-            </a:r>
-            <a:r>
-              <a:rPr lang="en" sz="2400" b="1" baseline="-25000">
-                <a:latin typeface="Courier New"/>
-                <a:ea typeface="Courier New"/>
-                <a:cs typeface="Courier New"/>
-                <a:sym typeface="Courier New"/>
-              </a:rPr>
-              <a:t>1</a:t>
-            </a:r>
-            <a:r>
-              <a:rPr lang="en" sz="2400"/>
-              <a:t> (compatible) </a:t>
-            </a:r>
-          </a:p>
-          <a:p>
-            <a:pPr rtl="0">
-              <a:spcBef>
-                <a:spcPts val="0"/>
-              </a:spcBef>
-              <a:buNone/>
-            </a:pPr>
-            <a:endParaRPr sz="2400" b="1">
+            <a:endParaRPr sz="2400" b="1" dirty="0">
               <a:latin typeface="Courier New"/>
               <a:ea typeface="Courier New"/>
               <a:cs typeface="Courier New"/>
@@ -15499,7 +15687,7 @@
               <a:buNone/>
             </a:pPr>
             <a:r>
-              <a:rPr lang="en" sz="2400" b="1">
+              <a:rPr lang="en" sz="2400" b="1" dirty="0">
                 <a:latin typeface="Courier New"/>
                 <a:ea typeface="Courier New"/>
                 <a:cs typeface="Courier New"/>
@@ -15508,7 +15696,7 @@
               <a:t>x</a:t>
             </a:r>
             <a:r>
-              <a:rPr lang="en" sz="2400" b="1" baseline="-25000">
+              <a:rPr lang="en" sz="2400" b="1" baseline="-25000" dirty="0">
                 <a:latin typeface="Courier New"/>
                 <a:ea typeface="Courier New"/>
                 <a:cs typeface="Courier New"/>
@@ -15517,7 +15705,7 @@
               <a:t>0</a:t>
             </a:r>
             <a:r>
-              <a:rPr lang="en" sz="2400" b="1">
+              <a:rPr lang="en" sz="2400" b="1" dirty="0">
                 <a:latin typeface="Courier New"/>
                 <a:ea typeface="Courier New"/>
                 <a:cs typeface="Courier New"/>
@@ -15526,7 +15714,7 @@
               <a:t>∈B</a:t>
             </a:r>
             <a:r>
-              <a:rPr lang="en" sz="2400" b="1" baseline="-25000">
+              <a:rPr lang="en" sz="2400" b="1" baseline="-25000" dirty="0">
                 <a:latin typeface="Courier New"/>
                 <a:ea typeface="Courier New"/>
                 <a:cs typeface="Courier New"/>
@@ -15535,11 +15723,11 @@
               <a:t>0</a:t>
             </a:r>
             <a:r>
-              <a:rPr lang="en" sz="2400"/>
+              <a:rPr lang="en" sz="2400" dirty="0"/>
               <a:t>, </a:t>
             </a:r>
             <a:r>
-              <a:rPr lang="en" sz="2400" b="1">
+              <a:rPr lang="en" sz="2400" b="1" dirty="0">
                 <a:latin typeface="Courier New"/>
                 <a:ea typeface="Courier New"/>
                 <a:cs typeface="Courier New"/>
@@ -15548,7 +15736,7 @@
               <a:t>x</a:t>
             </a:r>
             <a:r>
-              <a:rPr lang="en" sz="2400" b="1" baseline="-25000">
+              <a:rPr lang="en" sz="2400" b="1" baseline="-25000" dirty="0">
                 <a:latin typeface="Courier New"/>
                 <a:ea typeface="Courier New"/>
                 <a:cs typeface="Courier New"/>
@@ -15557,7 +15745,7 @@
               <a:t>1</a:t>
             </a:r>
             <a:r>
-              <a:rPr lang="en" sz="2400" b="1">
+              <a:rPr lang="en" sz="2400" b="1" dirty="0">
                 <a:latin typeface="Courier New"/>
                 <a:ea typeface="Courier New"/>
                 <a:cs typeface="Courier New"/>
@@ -15566,7 +15754,7 @@
               <a:t>∈B</a:t>
             </a:r>
             <a:r>
-              <a:rPr lang="en" sz="2400" b="1" baseline="-25000">
+              <a:rPr lang="en" sz="2400" b="1" baseline="-25000" dirty="0">
                 <a:latin typeface="Courier New"/>
                 <a:ea typeface="Courier New"/>
                 <a:cs typeface="Courier New"/>
@@ -15575,11 +15763,11 @@
               <a:t>1</a:t>
             </a:r>
             <a:r>
-              <a:rPr lang="en" sz="2400"/>
+              <a:rPr lang="en" sz="2400" dirty="0"/>
               <a:t>; if </a:t>
             </a:r>
             <a:r>
-              <a:rPr lang="en" sz="2400" b="1">
+              <a:rPr lang="en" sz="2400" b="1" dirty="0">
                 <a:latin typeface="Courier New"/>
                 <a:ea typeface="Courier New"/>
                 <a:cs typeface="Courier New"/>
@@ -15588,7 +15776,7 @@
               <a:t>x</a:t>
             </a:r>
             <a:r>
-              <a:rPr lang="en" sz="2400" b="1" baseline="-25000">
+              <a:rPr lang="en" sz="2400" b="1" baseline="-25000" dirty="0">
                 <a:latin typeface="Courier New"/>
                 <a:ea typeface="Courier New"/>
                 <a:cs typeface="Courier New"/>
@@ -15597,7 +15785,7 @@
               <a:t>0</a:t>
             </a:r>
             <a:r>
-              <a:rPr lang="en" sz="2400" b="1">
+              <a:rPr lang="en" sz="2400" b="1" dirty="0">
                 <a:latin typeface="Courier New"/>
                 <a:ea typeface="Courier New"/>
                 <a:cs typeface="Courier New"/>
@@ -15606,7 +15794,7 @@
               <a:t>∈A</a:t>
             </a:r>
             <a:r>
-              <a:rPr lang="en" sz="2400" b="1" baseline="-25000">
+              <a:rPr lang="en" sz="2400" b="1" baseline="-25000" dirty="0">
                 <a:latin typeface="Courier New"/>
                 <a:ea typeface="Courier New"/>
                 <a:cs typeface="Courier New"/>
@@ -15615,11 +15803,11 @@
               <a:t>0</a:t>
             </a:r>
             <a:r>
-              <a:rPr lang="en" sz="2400"/>
+              <a:rPr lang="en" sz="2400" dirty="0"/>
               <a:t> then </a:t>
             </a:r>
             <a:r>
-              <a:rPr lang="en" sz="2400" b="1">
+              <a:rPr lang="en" sz="2400" b="1" dirty="0">
                 <a:latin typeface="Courier New"/>
                 <a:ea typeface="Courier New"/>
                 <a:cs typeface="Courier New"/>
@@ -15628,7 +15816,7 @@
               <a:t>x</a:t>
             </a:r>
             <a:r>
-              <a:rPr lang="en" sz="2400" b="1" baseline="-25000">
+              <a:rPr lang="en" sz="2400" b="1" baseline="-25000" dirty="0">
                 <a:latin typeface="Courier New"/>
                 <a:ea typeface="Courier New"/>
                 <a:cs typeface="Courier New"/>
@@ -15637,7 +15825,7 @@
               <a:t>1</a:t>
             </a:r>
             <a:r>
-              <a:rPr lang="en" sz="2400" b="1">
+              <a:rPr lang="en" sz="2400" b="1" dirty="0">
                 <a:latin typeface="Courier New"/>
                 <a:ea typeface="Courier New"/>
                 <a:cs typeface="Courier New"/>
@@ -15646,7 +15834,7 @@
               <a:t>∈A</a:t>
             </a:r>
             <a:r>
-              <a:rPr lang="en" sz="2400" b="1" baseline="-25000">
+              <a:rPr lang="en" sz="2400" b="1" baseline="-25000" dirty="0">
                 <a:latin typeface="Courier New"/>
                 <a:ea typeface="Courier New"/>
                 <a:cs typeface="Courier New"/>
@@ -15762,7 +15950,7 @@
               <a:buNone/>
             </a:pPr>
             <a:r>
-              <a:rPr lang="en" sz="2400" b="1">
+              <a:rPr lang="en" sz="2400" b="1" dirty="0">
                 <a:latin typeface="Courier New"/>
                 <a:ea typeface="Courier New"/>
                 <a:cs typeface="Courier New"/>
@@ -15771,7 +15959,7 @@
               <a:t>Unit</a:t>
             </a:r>
             <a:r>
-              <a:rPr lang="en" sz="2400"/>
+              <a:rPr lang="en" sz="2400" dirty="0"/>
               <a:t>:</a:t>
             </a:r>
           </a:p>
@@ -15783,11 +15971,11 @@
               <a:buNone/>
             </a:pPr>
             <a:r>
-              <a:rPr lang="en" sz="2400"/>
+              <a:rPr lang="en" sz="2400" dirty="0"/>
               <a:t>Subtypes of </a:t>
             </a:r>
             <a:r>
-              <a:rPr lang="en" sz="2400" b="1">
+              <a:rPr lang="en" sz="2400" b="1" dirty="0">
                 <a:latin typeface="Courier New"/>
                 <a:ea typeface="Courier New"/>
                 <a:cs typeface="Courier New"/>
@@ -15796,7 +15984,7 @@
               <a:t>Unit</a:t>
             </a:r>
             <a:r>
-              <a:rPr lang="en" sz="2400"/>
+              <a:rPr lang="en" sz="2400" dirty="0"/>
               <a:t>:</a:t>
             </a:r>
           </a:p>
@@ -15813,7 +16001,7 @@
               <a:buChar char="-"/>
             </a:pPr>
             <a:r>
-              <a:rPr lang="en" sz="2400" b="1">
+              <a:rPr lang="en" sz="2400" b="1" dirty="0">
                 <a:latin typeface="Courier New"/>
                 <a:ea typeface="Courier New"/>
                 <a:cs typeface="Courier New"/>
@@ -15835,7 +16023,7 @@
               <a:buChar char="-"/>
             </a:pPr>
             <a:r>
-              <a:rPr lang="en" sz="2400" b="1">
+              <a:rPr lang="en" sz="2400" b="1" dirty="0">
                 <a:latin typeface="Courier New"/>
                 <a:ea typeface="Courier New"/>
                 <a:cs typeface="Courier New"/>
@@ -15857,7 +16045,7 @@
               <a:buChar char="-"/>
             </a:pPr>
             <a:r>
-              <a:rPr lang="en" sz="2400" b="1">
+              <a:rPr lang="en" sz="2400" b="1" dirty="0">
                 <a:latin typeface="Courier New"/>
                 <a:ea typeface="Courier New"/>
                 <a:cs typeface="Courier New"/>
@@ -15866,7 +16054,7 @@
               <a:t>Half-Unit</a:t>
             </a:r>
             <a:r>
-              <a:rPr lang="en" sz="2400"/>
+              <a:rPr lang="en" sz="2400" dirty="0"/>
               <a:t> (empty “before”, point “after”)</a:t>
             </a:r>
           </a:p>
@@ -15877,9 +16065,22 @@
               </a:spcBef>
               <a:buNone/>
             </a:pPr>
-            <a:r>
-              <a:rPr lang="en" sz="2400"/>
-              <a:t>Point and a half: </a:t>
+            <a:endParaRPr lang="en-US" sz="2400" dirty="0" smtClean="0"/>
+          </a:p>
+          <a:p>
+            <a:pPr lvl="0" rtl="0">
+              <a:spcBef>
+                <a:spcPts val="0"/>
+              </a:spcBef>
+              <a:buNone/>
+            </a:pPr>
+            <a:r>
+              <a:rPr lang="en" sz="2400" dirty="0" smtClean="0"/>
+              <a:t>Point </a:t>
+            </a:r>
+            <a:r>
+              <a:rPr lang="en" sz="2400" dirty="0"/>
+              <a:t>and a half: </a:t>
             </a:r>
           </a:p>
         </p:txBody>
@@ -19940,15 +20141,15 @@
               <a:buNone/>
             </a:pPr>
             <a:r>
-              <a:rPr lang="en" sz="2400" i="1"/>
+              <a:rPr lang="en" sz="2400" i="1" dirty="0"/>
               <a:t>Subtype</a:t>
             </a:r>
             <a:r>
-              <a:rPr lang="en" sz="2400"/>
+              <a:rPr lang="en" sz="2400" dirty="0"/>
               <a:t> </a:t>
             </a:r>
             <a:r>
-              <a:rPr lang="en" sz="2400" b="1">
+              <a:rPr lang="en" sz="2400" b="1" dirty="0">
                 <a:latin typeface="Courier New"/>
                 <a:ea typeface="Courier New"/>
                 <a:cs typeface="Courier New"/>
@@ -19957,7 +20158,7 @@
               <a:t>h:A</a:t>
             </a:r>
             <a:r>
-              <a:rPr lang="en" sz="1200" b="1">
+              <a:rPr lang="en" sz="1200" b="1" dirty="0">
                 <a:latin typeface="Courier New"/>
                 <a:ea typeface="Courier New"/>
                 <a:cs typeface="Courier New"/>
@@ -19966,7 +20167,7 @@
               <a:t>↪</a:t>
             </a:r>
             <a:r>
-              <a:rPr lang="en" sz="2400" b="1">
+              <a:rPr lang="en" sz="2400" b="1" dirty="0">
                 <a:latin typeface="Courier New"/>
                 <a:ea typeface="Courier New"/>
                 <a:cs typeface="Courier New"/>
@@ -19975,7 +20176,7 @@
               <a:t>B</a:t>
             </a:r>
             <a:r>
-              <a:rPr lang="en" sz="2400">
+              <a:rPr lang="en" sz="2400" dirty="0">
                 <a:latin typeface="Courier New"/>
                 <a:ea typeface="Courier New"/>
                 <a:cs typeface="Courier New"/>
@@ -19984,8 +20185,16 @@
               <a:t> </a:t>
             </a:r>
             <a:r>
-              <a:rPr lang="en" sz="2400"/>
-              <a:t>- a function such that:</a:t>
+              <a:rPr lang="en-US" sz="2400" dirty="0" smtClean="0"/>
+              <a:t>is</a:t>
+            </a:r>
+            <a:r>
+              <a:rPr lang="en" sz="2400" dirty="0" smtClean="0"/>
+              <a:t> </a:t>
+            </a:r>
+            <a:r>
+              <a:rPr lang="en" sz="2400" dirty="0"/>
+              <a:t>a function such that:</a:t>
             </a:r>
           </a:p>
           <a:p>
@@ -19996,11 +20205,11 @@
               <a:buNone/>
             </a:pPr>
             <a:r>
-              <a:rPr lang="en" sz="2400"/>
+              <a:rPr lang="en" sz="2400" dirty="0"/>
               <a:t>(for every </a:t>
             </a:r>
             <a:r>
-              <a:rPr lang="en" sz="2400" b="1">
+              <a:rPr lang="en" sz="2400" b="1" dirty="0">
                 <a:latin typeface="Courier New"/>
                 <a:ea typeface="Courier New"/>
                 <a:cs typeface="Courier New"/>
@@ -20009,7 +20218,7 @@
               <a:t>f,g:C→A</a:t>
             </a:r>
             <a:r>
-              <a:rPr lang="en" sz="2400">
+              <a:rPr lang="en" sz="2400" dirty="0">
                 <a:latin typeface="Courier New"/>
                 <a:ea typeface="Courier New"/>
                 <a:cs typeface="Courier New"/>
@@ -20018,11 +20227,11 @@
               <a:t>)</a:t>
             </a:r>
             <a:r>
-              <a:rPr lang="en" sz="2400"/>
+              <a:rPr lang="en" sz="2400" dirty="0"/>
               <a:t> if </a:t>
             </a:r>
             <a:r>
-              <a:rPr lang="en" sz="2400" b="1">
+              <a:rPr lang="en" sz="2400" b="1" dirty="0">
                 <a:latin typeface="Courier New"/>
                 <a:ea typeface="Courier New"/>
                 <a:cs typeface="Courier New"/>
@@ -20031,11 +20240,11 @@
               <a:t>h∘f = h∘g</a:t>
             </a:r>
             <a:r>
-              <a:rPr lang="en" sz="2400"/>
+              <a:rPr lang="en" sz="2400" dirty="0"/>
               <a:t>, then </a:t>
             </a:r>
             <a:r>
-              <a:rPr lang="en" sz="2400" b="1">
+              <a:rPr lang="en" sz="2400" b="1" dirty="0">
                 <a:latin typeface="Courier New"/>
                 <a:ea typeface="Courier New"/>
                 <a:cs typeface="Courier New"/>
@@ -20051,7 +20260,7 @@
               </a:spcBef>
               <a:buNone/>
             </a:pPr>
-            <a:endParaRPr sz="2400"/>
+            <a:endParaRPr sz="2400" dirty="0"/>
           </a:p>
           <a:p>
             <a:pPr rtl="0">
@@ -20061,11 +20270,11 @@
               <a:buNone/>
             </a:pPr>
             <a:r>
-              <a:rPr lang="en" sz="2400"/>
+              <a:rPr lang="en" sz="2400" dirty="0"/>
               <a:t>For typographical reasons I’ll denote this as </a:t>
             </a:r>
             <a:r>
-              <a:rPr lang="en" sz="2400" b="1">
+              <a:rPr lang="en" sz="2400" b="1" dirty="0">
                 <a:latin typeface="Courier New"/>
                 <a:ea typeface="Courier New"/>
                 <a:cs typeface="Courier New"/>
@@ -20074,11 +20283,11 @@
               <a:t>h:A</a:t>
             </a:r>
             <a:r>
-              <a:rPr lang="en" sz="2400" b="1"/>
+              <a:rPr lang="en" sz="2400" b="1" dirty="0"/>
               <a:t>↣</a:t>
             </a:r>
             <a:r>
-              <a:rPr lang="en" sz="2400" b="1">
+              <a:rPr lang="en" sz="2400" b="1" dirty="0">
                 <a:latin typeface="Courier New"/>
                 <a:ea typeface="Courier New"/>
                 <a:cs typeface="Courier New"/>
@@ -20094,7 +20303,7 @@
               </a:spcBef>
               <a:buNone/>
             </a:pPr>
-            <a:endParaRPr sz="2400">
+            <a:endParaRPr sz="2400" dirty="0">
               <a:latin typeface="Courier New"/>
               <a:ea typeface="Courier New"/>
               <a:cs typeface="Courier New"/>
@@ -20109,11 +20318,11 @@
               <a:buNone/>
             </a:pPr>
             <a:r>
-              <a:rPr lang="en" sz="2400" b="1"/>
+              <a:rPr lang="en" sz="2400" b="1" dirty="0"/>
               <a:t>Yes, this is a definition of subtype.</a:t>
             </a:r>
             <a:r>
-              <a:rPr lang="en" sz="2400"/>
+              <a:rPr lang="en" sz="2400" dirty="0"/>
               <a:t> It is more than a relationship; we need a way to map one type to another, and there can be more than one such way</a:t>
             </a:r>
           </a:p>
@@ -20124,7 +20333,7 @@
               </a:spcBef>
               <a:buNone/>
             </a:pPr>
-            <a:endParaRPr sz="2400"/>
+            <a:endParaRPr sz="2400" dirty="0"/>
           </a:p>
         </p:txBody>
       </p:sp>

</xml_diff>